<commit_message>
Added working Word Mode
</commit_message>
<xml_diff>
--- a/Template.pptx
+++ b/Template.pptx
@@ -5,14 +5,15 @@
     <p:sldMasterId id="2147483660" r:id="rId1"/>
   </p:sldMasterIdLst>
   <p:notesMasterIdLst>
-    <p:notesMasterId r:id="rId7"/>
+    <p:notesMasterId r:id="rId8"/>
   </p:notesMasterIdLst>
   <p:sldIdLst>
     <p:sldId id="256" r:id="rId2"/>
     <p:sldId id="258" r:id="rId3"/>
     <p:sldId id="257" r:id="rId4"/>
     <p:sldId id="259" r:id="rId5"/>
-    <p:sldId id="260" r:id="rId6"/>
+    <p:sldId id="261" r:id="rId6"/>
+    <p:sldId id="260" r:id="rId7"/>
   </p:sldIdLst>
   <p:sldSz cx="1046163" cy="2408238"/>
   <p:notesSz cx="6858000" cy="9144000"/>
@@ -201,7 +202,7 @@
           <a:p>
             <a:fld id="{51EDFC51-4C06-47C1-8863-7AA26D3AE3DA}" type="datetimeFigureOut">
               <a:rPr lang="en-GB" smtClean="0"/>
-              <a:t>11/05/2024</a:t>
+              <a:t>12/05/2024</a:t>
             </a:fld>
             <a:endParaRPr lang="en-GB"/>
           </a:p>
@@ -8921,141 +8922,62 @@
                 <a:ea typeface="Yu Mincho" panose="02020400000000000000" pitchFamily="18" charset="-128"/>
                 <a:cs typeface="Arial" panose="020B0604020202020204" pitchFamily="34" charset="0"/>
               </a:rPr>
-              <a:t>New Comment {Ctrl + Alt + M}</a:t>
-            </a:r>
-          </a:p>
-          <a:p>
-            <a:pPr>
-              <a:lnSpc>
-                <a:spcPct val="107000"/>
-              </a:lnSpc>
-              <a:spcAft>
-                <a:spcPts val="800"/>
-              </a:spcAft>
-            </a:pPr>
-            <a:r>
-              <a:rPr lang="en-GB" sz="1800" dirty="0">
-                <a:effectLst/>
-                <a:latin typeface="Calibri" panose="020F0502020204030204" pitchFamily="34" charset="0"/>
-                <a:ea typeface="Yu Mincho" panose="02020400000000000000" pitchFamily="18" charset="-128"/>
-                <a:cs typeface="Arial" panose="020B0604020202020204" pitchFamily="34" charset="0"/>
-              </a:rPr>
-              <a:t>Delete Comment {Alt, R. D, D}</a:t>
-            </a:r>
-          </a:p>
-          <a:p>
-            <a:pPr>
-              <a:lnSpc>
-                <a:spcPct val="107000"/>
-              </a:lnSpc>
-              <a:spcAft>
-                <a:spcPts val="800"/>
-              </a:spcAft>
-            </a:pPr>
-            <a:r>
-              <a:rPr lang="en-GB" sz="1800" dirty="0">
-                <a:effectLst/>
-                <a:latin typeface="Calibri" panose="020F0502020204030204" pitchFamily="34" charset="0"/>
-                <a:ea typeface="Yu Mincho" panose="02020400000000000000" pitchFamily="18" charset="-128"/>
-                <a:cs typeface="Arial" panose="020B0604020202020204" pitchFamily="34" charset="0"/>
-              </a:rPr>
-              <a:t>Previous Comment {Alt, R, V}</a:t>
-            </a:r>
-          </a:p>
-          <a:p>
-            <a:pPr>
-              <a:lnSpc>
-                <a:spcPct val="107000"/>
-              </a:lnSpc>
-              <a:spcAft>
-                <a:spcPts val="800"/>
-              </a:spcAft>
-            </a:pPr>
-            <a:r>
-              <a:rPr lang="en-GB" sz="1800" dirty="0">
-                <a:effectLst/>
-                <a:latin typeface="Calibri" panose="020F0502020204030204" pitchFamily="34" charset="0"/>
-                <a:ea typeface="Yu Mincho" panose="02020400000000000000" pitchFamily="18" charset="-128"/>
-                <a:cs typeface="Arial" panose="020B0604020202020204" pitchFamily="34" charset="0"/>
-              </a:rPr>
-              <a:t>Next Comment {Alt, R, N}</a:t>
-            </a:r>
-          </a:p>
-          <a:p>
-            <a:pPr>
-              <a:lnSpc>
-                <a:spcPct val="107000"/>
-              </a:lnSpc>
-              <a:spcAft>
-                <a:spcPts val="800"/>
-              </a:spcAft>
-            </a:pPr>
-            <a:r>
-              <a:rPr lang="en-GB" sz="1800" dirty="0">
-                <a:effectLst/>
-                <a:latin typeface="Calibri" panose="020F0502020204030204" pitchFamily="34" charset="0"/>
-                <a:ea typeface="Yu Mincho" panose="02020400000000000000" pitchFamily="18" charset="-128"/>
-                <a:cs typeface="Arial" panose="020B0604020202020204" pitchFamily="34" charset="0"/>
-              </a:rPr>
-              <a:t>Accept Change {Alt, R, A2, M}</a:t>
-            </a:r>
-          </a:p>
-          <a:p>
-            <a:pPr>
-              <a:lnSpc>
-                <a:spcPct val="107000"/>
-              </a:lnSpc>
-              <a:spcAft>
-                <a:spcPts val="800"/>
-              </a:spcAft>
-            </a:pPr>
-            <a:r>
-              <a:rPr lang="en-GB" sz="1800" dirty="0">
-                <a:effectLst/>
-                <a:latin typeface="Calibri" panose="020F0502020204030204" pitchFamily="34" charset="0"/>
-                <a:ea typeface="Yu Mincho" panose="02020400000000000000" pitchFamily="18" charset="-128"/>
-                <a:cs typeface="Arial" panose="020B0604020202020204" pitchFamily="34" charset="0"/>
-              </a:rPr>
-              <a:t>Next Change {A, R, H1}</a:t>
-            </a:r>
-          </a:p>
-          <a:p>
-            <a:pPr>
-              <a:lnSpc>
-                <a:spcPct val="107000"/>
-              </a:lnSpc>
-              <a:spcAft>
-                <a:spcPts val="800"/>
-              </a:spcAft>
-            </a:pPr>
-            <a:r>
-              <a:rPr lang="en-GB" sz="1800" dirty="0">
-                <a:effectLst/>
-                <a:latin typeface="Calibri" panose="020F0502020204030204" pitchFamily="34" charset="0"/>
-                <a:ea typeface="Yu Mincho" panose="02020400000000000000" pitchFamily="18" charset="-128"/>
-                <a:cs typeface="Arial" panose="020B0604020202020204" pitchFamily="34" charset="0"/>
-              </a:rPr>
-              <a:t>Reject Change {Alt, R, J, M}</a:t>
-            </a:r>
-          </a:p>
-          <a:p>
-            <a:pPr>
-              <a:lnSpc>
-                <a:spcPct val="107000"/>
-              </a:lnSpc>
-              <a:spcAft>
-                <a:spcPts val="800"/>
-              </a:spcAft>
-            </a:pPr>
-            <a:r>
-              <a:rPr lang="en-GB" sz="1800" dirty="0">
-                <a:effectLst/>
-                <a:latin typeface="Calibri" panose="020F0502020204030204" pitchFamily="34" charset="0"/>
-                <a:ea typeface="Yu Mincho" panose="02020400000000000000" pitchFamily="18" charset="-128"/>
-                <a:cs typeface="Arial" panose="020B0604020202020204" pitchFamily="34" charset="0"/>
-              </a:rPr>
-              <a:t>Accept All {Alt, R, A2, L}</a:t>
-            </a:r>
+              <a:t>Run {Ctrl + Shift + P, Python Run, Enter}</a:t>
+            </a:r>
+          </a:p>
+          <a:p>
+            <a:pPr>
+              <a:lnSpc>
+                <a:spcPct val="107000"/>
+              </a:lnSpc>
+              <a:spcAft>
+                <a:spcPts val="800"/>
+              </a:spcAft>
+            </a:pPr>
+            <a:r>
+              <a:rPr lang="en-GB" sz="1800" dirty="0">
+                <a:effectLst/>
+                <a:latin typeface="Calibri" panose="020F0502020204030204" pitchFamily="34" charset="0"/>
+                <a:ea typeface="Yu Mincho" panose="02020400000000000000" pitchFamily="18" charset="-128"/>
+                <a:cs typeface="Arial" panose="020B0604020202020204" pitchFamily="34" charset="0"/>
+              </a:rPr>
+              <a:t>Debug {f5}</a:t>
+            </a:r>
+          </a:p>
+          <a:p>
+            <a:pPr>
+              <a:lnSpc>
+                <a:spcPct val="107000"/>
+              </a:lnSpc>
+              <a:spcAft>
+                <a:spcPts val="800"/>
+              </a:spcAft>
+            </a:pPr>
+            <a:r>
+              <a:rPr lang="en-GB" sz="1800" dirty="0">
+                <a:effectLst/>
+                <a:latin typeface="Calibri" panose="020F0502020204030204" pitchFamily="34" charset="0"/>
+                <a:ea typeface="Yu Mincho" panose="02020400000000000000" pitchFamily="18" charset="-128"/>
+                <a:cs typeface="Arial" panose="020B0604020202020204" pitchFamily="34" charset="0"/>
+              </a:rPr>
+              <a:t>Add Breakpoint {f9}</a:t>
+            </a:r>
+          </a:p>
+          <a:p>
+            <a:pPr>
+              <a:lnSpc>
+                <a:spcPct val="107000"/>
+              </a:lnSpc>
+              <a:spcAft>
+                <a:spcPts val="800"/>
+              </a:spcAft>
+            </a:pPr>
+            <a:endParaRPr lang="en-GB" sz="1800" dirty="0">
+              <a:effectLst/>
+              <a:latin typeface="Calibri" panose="020F0502020204030204" pitchFamily="34" charset="0"/>
+              <a:ea typeface="Yu Mincho" panose="02020400000000000000" pitchFamily="18" charset="-128"/>
+              <a:cs typeface="Arial" panose="020B0604020202020204" pitchFamily="34" charset="0"/>
+            </a:endParaRPr>
           </a:p>
         </p:txBody>
       </p:sp>
@@ -9077,6 +8999,239 @@
             <a:fld id="{AD72BDD0-34C8-4178-8D35-D94E7CA1241E}" type="slidenum">
               <a:rPr lang="en-GB" smtClean="0"/>
               <a:t>5</a:t>
+            </a:fld>
+            <a:endParaRPr lang="en-GB"/>
+          </a:p>
+        </p:txBody>
+      </p:sp>
+    </p:spTree>
+    <p:extLst>
+      <p:ext uri="{BB962C8B-B14F-4D97-AF65-F5344CB8AC3E}">
+        <p14:creationId xmlns:p14="http://schemas.microsoft.com/office/powerpoint/2010/main" val="127385700"/>
+      </p:ext>
+    </p:extLst>
+  </p:cSld>
+  <p:clrMapOvr>
+    <a:masterClrMapping/>
+  </p:clrMapOvr>
+</p:notes>
+</file>
+
+<file path=ppt/notesSlides/notesSlide6.xml><?xml version="1.0" encoding="utf-8"?>
+<p:notes xmlns:a="http://schemas.openxmlformats.org/drawingml/2006/main" xmlns:r="http://schemas.openxmlformats.org/officeDocument/2006/relationships" xmlns:p="http://schemas.openxmlformats.org/presentationml/2006/main">
+  <p:cSld>
+    <p:spTree>
+      <p:nvGrpSpPr>
+        <p:cNvPr id="1" name=""/>
+        <p:cNvGrpSpPr/>
+        <p:nvPr/>
+      </p:nvGrpSpPr>
+      <p:grpSpPr>
+        <a:xfrm>
+          <a:off x="0" y="0"/>
+          <a:ext cx="0" cy="0"/>
+          <a:chOff x="0" y="0"/>
+          <a:chExt cx="0" cy="0"/>
+        </a:xfrm>
+      </p:grpSpPr>
+      <p:sp>
+        <p:nvSpPr>
+          <p:cNvPr id="2" name="Slide Image Placeholder 1"/>
+          <p:cNvSpPr>
+            <a:spLocks noGrp="1" noRot="1" noChangeAspect="1"/>
+          </p:cNvSpPr>
+          <p:nvPr>
+            <p:ph type="sldImg"/>
+          </p:nvPr>
+        </p:nvSpPr>
+        <p:spPr/>
+      </p:sp>
+      <p:sp>
+        <p:nvSpPr>
+          <p:cNvPr id="3" name="Notes Placeholder 2"/>
+          <p:cNvSpPr>
+            <a:spLocks noGrp="1"/>
+          </p:cNvSpPr>
+          <p:nvPr>
+            <p:ph type="body" idx="1"/>
+          </p:nvPr>
+        </p:nvSpPr>
+        <p:spPr/>
+        <p:txBody>
+          <a:bodyPr/>
+          <a:lstStyle/>
+          <a:p>
+            <a:pPr>
+              <a:lnSpc>
+                <a:spcPct val="107000"/>
+              </a:lnSpc>
+              <a:spcAft>
+                <a:spcPts val="800"/>
+              </a:spcAft>
+            </a:pPr>
+            <a:r>
+              <a:rPr lang="en-GB" sz="1800" dirty="0">
+                <a:effectLst/>
+                <a:latin typeface="Calibri" panose="020F0502020204030204" pitchFamily="34" charset="0"/>
+                <a:ea typeface="Yu Mincho" panose="02020400000000000000" pitchFamily="18" charset="-128"/>
+                <a:cs typeface="Arial" panose="020B0604020202020204" pitchFamily="34" charset="0"/>
+              </a:rPr>
+              <a:t>New Comment {Ctrl + Alt + M}</a:t>
+            </a:r>
+          </a:p>
+          <a:p>
+            <a:pPr>
+              <a:lnSpc>
+                <a:spcPct val="107000"/>
+              </a:lnSpc>
+              <a:spcAft>
+                <a:spcPts val="800"/>
+              </a:spcAft>
+            </a:pPr>
+            <a:r>
+              <a:rPr lang="en-GB" sz="1800" dirty="0">
+                <a:effectLst/>
+                <a:latin typeface="Calibri" panose="020F0502020204030204" pitchFamily="34" charset="0"/>
+                <a:ea typeface="Yu Mincho" panose="02020400000000000000" pitchFamily="18" charset="-128"/>
+                <a:cs typeface="Arial" panose="020B0604020202020204" pitchFamily="34" charset="0"/>
+              </a:rPr>
+              <a:t>Delete Comment {Alt, R. D, D}</a:t>
+            </a:r>
+          </a:p>
+          <a:p>
+            <a:pPr>
+              <a:lnSpc>
+                <a:spcPct val="107000"/>
+              </a:lnSpc>
+              <a:spcAft>
+                <a:spcPts val="800"/>
+              </a:spcAft>
+            </a:pPr>
+            <a:r>
+              <a:rPr lang="en-GB" sz="1800" dirty="0">
+                <a:effectLst/>
+                <a:latin typeface="Calibri" panose="020F0502020204030204" pitchFamily="34" charset="0"/>
+                <a:ea typeface="Yu Mincho" panose="02020400000000000000" pitchFamily="18" charset="-128"/>
+                <a:cs typeface="Arial" panose="020B0604020202020204" pitchFamily="34" charset="0"/>
+              </a:rPr>
+              <a:t>Previous Comment {Alt, R, V}</a:t>
+            </a:r>
+          </a:p>
+          <a:p>
+            <a:pPr>
+              <a:lnSpc>
+                <a:spcPct val="107000"/>
+              </a:lnSpc>
+              <a:spcAft>
+                <a:spcPts val="800"/>
+              </a:spcAft>
+            </a:pPr>
+            <a:r>
+              <a:rPr lang="en-GB" sz="1800" dirty="0">
+                <a:effectLst/>
+                <a:latin typeface="Calibri" panose="020F0502020204030204" pitchFamily="34" charset="0"/>
+                <a:ea typeface="Yu Mincho" panose="02020400000000000000" pitchFamily="18" charset="-128"/>
+                <a:cs typeface="Arial" panose="020B0604020202020204" pitchFamily="34" charset="0"/>
+              </a:rPr>
+              <a:t>Next Comment {Alt, R, N}</a:t>
+            </a:r>
+          </a:p>
+          <a:p>
+            <a:pPr>
+              <a:lnSpc>
+                <a:spcPct val="107000"/>
+              </a:lnSpc>
+              <a:spcAft>
+                <a:spcPts val="800"/>
+              </a:spcAft>
+            </a:pPr>
+            <a:r>
+              <a:rPr lang="en-GB" sz="1800" dirty="0">
+                <a:effectLst/>
+                <a:latin typeface="Calibri" panose="020F0502020204030204" pitchFamily="34" charset="0"/>
+                <a:ea typeface="Yu Mincho" panose="02020400000000000000" pitchFamily="18" charset="-128"/>
+                <a:cs typeface="Arial" panose="020B0604020202020204" pitchFamily="34" charset="0"/>
+              </a:rPr>
+              <a:t>Accept Change {Alt, R, A2, M}</a:t>
+            </a:r>
+          </a:p>
+          <a:p>
+            <a:pPr>
+              <a:lnSpc>
+                <a:spcPct val="107000"/>
+              </a:lnSpc>
+              <a:spcAft>
+                <a:spcPts val="800"/>
+              </a:spcAft>
+            </a:pPr>
+            <a:r>
+              <a:rPr lang="en-GB" sz="1800" dirty="0">
+                <a:effectLst/>
+                <a:latin typeface="Calibri" panose="020F0502020204030204" pitchFamily="34" charset="0"/>
+                <a:ea typeface="Yu Mincho" panose="02020400000000000000" pitchFamily="18" charset="-128"/>
+                <a:cs typeface="Arial" panose="020B0604020202020204" pitchFamily="34" charset="0"/>
+              </a:rPr>
+              <a:t>Next Change {A, R, H1}</a:t>
+            </a:r>
+          </a:p>
+          <a:p>
+            <a:pPr>
+              <a:lnSpc>
+                <a:spcPct val="107000"/>
+              </a:lnSpc>
+              <a:spcAft>
+                <a:spcPts val="800"/>
+              </a:spcAft>
+            </a:pPr>
+            <a:r>
+              <a:rPr lang="en-GB" sz="1800" dirty="0">
+                <a:effectLst/>
+                <a:latin typeface="Calibri" panose="020F0502020204030204" pitchFamily="34" charset="0"/>
+                <a:ea typeface="Yu Mincho" panose="02020400000000000000" pitchFamily="18" charset="-128"/>
+                <a:cs typeface="Arial" panose="020B0604020202020204" pitchFamily="34" charset="0"/>
+              </a:rPr>
+              <a:t>Reject Change {Alt, R, J, M}</a:t>
+            </a:r>
+          </a:p>
+          <a:p>
+            <a:pPr>
+              <a:lnSpc>
+                <a:spcPct val="107000"/>
+              </a:lnSpc>
+              <a:spcAft>
+                <a:spcPts val="800"/>
+              </a:spcAft>
+            </a:pPr>
+            <a:r>
+              <a:rPr lang="en-GB" sz="1800" dirty="0">
+                <a:effectLst/>
+                <a:latin typeface="Calibri" panose="020F0502020204030204" pitchFamily="34" charset="0"/>
+                <a:ea typeface="Yu Mincho" panose="02020400000000000000" pitchFamily="18" charset="-128"/>
+                <a:cs typeface="Arial" panose="020B0604020202020204" pitchFamily="34" charset="0"/>
+              </a:rPr>
+              <a:t>Accept All {Alt, R, A2, L}</a:t>
+            </a:r>
+          </a:p>
+        </p:txBody>
+      </p:sp>
+      <p:sp>
+        <p:nvSpPr>
+          <p:cNvPr id="4" name="Slide Number Placeholder 3"/>
+          <p:cNvSpPr>
+            <a:spLocks noGrp="1"/>
+          </p:cNvSpPr>
+          <p:nvPr>
+            <p:ph type="sldNum" sz="quarter" idx="5"/>
+          </p:nvPr>
+        </p:nvSpPr>
+        <p:spPr/>
+        <p:txBody>
+          <a:bodyPr/>
+          <a:lstStyle/>
+          <a:p>
+            <a:fld id="{AD72BDD0-34C8-4178-8D35-D94E7CA1241E}" type="slidenum">
+              <a:rPr lang="en-GB" smtClean="0"/>
+              <a:t>6</a:t>
             </a:fld>
             <a:endParaRPr lang="en-GB"/>
           </a:p>
@@ -9226,7 +9381,7 @@
           <a:p>
             <a:fld id="{EB80AE36-72A3-4046-B6E9-F6C2EA2323C6}" type="datetimeFigureOut">
               <a:rPr lang="en-GB" smtClean="0"/>
-              <a:t>11/05/2024</a:t>
+              <a:t>12/05/2024</a:t>
             </a:fld>
             <a:endParaRPr lang="en-GB"/>
           </a:p>
@@ -9396,7 +9551,7 @@
           <a:p>
             <a:fld id="{EB80AE36-72A3-4046-B6E9-F6C2EA2323C6}" type="datetimeFigureOut">
               <a:rPr lang="en-GB" smtClean="0"/>
-              <a:t>11/05/2024</a:t>
+              <a:t>12/05/2024</a:t>
             </a:fld>
             <a:endParaRPr lang="en-GB"/>
           </a:p>
@@ -9576,7 +9731,7 @@
           <a:p>
             <a:fld id="{EB80AE36-72A3-4046-B6E9-F6C2EA2323C6}" type="datetimeFigureOut">
               <a:rPr lang="en-GB" smtClean="0"/>
-              <a:t>11/05/2024</a:t>
+              <a:t>12/05/2024</a:t>
             </a:fld>
             <a:endParaRPr lang="en-GB"/>
           </a:p>
@@ -9746,7 +9901,7 @@
           <a:p>
             <a:fld id="{EB80AE36-72A3-4046-B6E9-F6C2EA2323C6}" type="datetimeFigureOut">
               <a:rPr lang="en-GB" smtClean="0"/>
-              <a:t>11/05/2024</a:t>
+              <a:t>12/05/2024</a:t>
             </a:fld>
             <a:endParaRPr lang="en-GB"/>
           </a:p>
@@ -9990,7 +10145,7 @@
           <a:p>
             <a:fld id="{EB80AE36-72A3-4046-B6E9-F6C2EA2323C6}" type="datetimeFigureOut">
               <a:rPr lang="en-GB" smtClean="0"/>
-              <a:t>11/05/2024</a:t>
+              <a:t>12/05/2024</a:t>
             </a:fld>
             <a:endParaRPr lang="en-GB"/>
           </a:p>
@@ -10222,7 +10377,7 @@
           <a:p>
             <a:fld id="{EB80AE36-72A3-4046-B6E9-F6C2EA2323C6}" type="datetimeFigureOut">
               <a:rPr lang="en-GB" smtClean="0"/>
-              <a:t>11/05/2024</a:t>
+              <a:t>12/05/2024</a:t>
             </a:fld>
             <a:endParaRPr lang="en-GB"/>
           </a:p>
@@ -10589,7 +10744,7 @@
           <a:p>
             <a:fld id="{EB80AE36-72A3-4046-B6E9-F6C2EA2323C6}" type="datetimeFigureOut">
               <a:rPr lang="en-GB" smtClean="0"/>
-              <a:t>11/05/2024</a:t>
+              <a:t>12/05/2024</a:t>
             </a:fld>
             <a:endParaRPr lang="en-GB"/>
           </a:p>
@@ -10707,7 +10862,7 @@
           <a:p>
             <a:fld id="{EB80AE36-72A3-4046-B6E9-F6C2EA2323C6}" type="datetimeFigureOut">
               <a:rPr lang="en-GB" smtClean="0"/>
-              <a:t>11/05/2024</a:t>
+              <a:t>12/05/2024</a:t>
             </a:fld>
             <a:endParaRPr lang="en-GB"/>
           </a:p>
@@ -10802,7 +10957,7 @@
           <a:p>
             <a:fld id="{EB80AE36-72A3-4046-B6E9-F6C2EA2323C6}" type="datetimeFigureOut">
               <a:rPr lang="en-GB" smtClean="0"/>
-              <a:t>11/05/2024</a:t>
+              <a:t>12/05/2024</a:t>
             </a:fld>
             <a:endParaRPr lang="en-GB"/>
           </a:p>
@@ -11079,7 +11234,7 @@
           <a:p>
             <a:fld id="{EB80AE36-72A3-4046-B6E9-F6C2EA2323C6}" type="datetimeFigureOut">
               <a:rPr lang="en-GB" smtClean="0"/>
-              <a:t>11/05/2024</a:t>
+              <a:t>12/05/2024</a:t>
             </a:fld>
             <a:endParaRPr lang="en-GB"/>
           </a:p>
@@ -11336,7 +11491,7 @@
           <a:p>
             <a:fld id="{EB80AE36-72A3-4046-B6E9-F6C2EA2323C6}" type="datetimeFigureOut">
               <a:rPr lang="en-GB" smtClean="0"/>
-              <a:t>11/05/2024</a:t>
+              <a:t>12/05/2024</a:t>
             </a:fld>
             <a:endParaRPr lang="en-GB"/>
           </a:p>
@@ -11549,7 +11704,7 @@
           <a:p>
             <a:fld id="{EB80AE36-72A3-4046-B6E9-F6C2EA2323C6}" type="datetimeFigureOut">
               <a:rPr lang="en-GB" smtClean="0"/>
-              <a:t>11/05/2024</a:t>
+              <a:t>12/05/2024</a:t>
             </a:fld>
             <a:endParaRPr lang="en-GB"/>
           </a:p>
@@ -14186,6 +14341,414 @@
 </file>
 
 <file path=ppt/slides/slide5.xml><?xml version="1.0" encoding="utf-8"?>
+<p:sld xmlns:a="http://schemas.openxmlformats.org/drawingml/2006/main" xmlns:r="http://schemas.openxmlformats.org/officeDocument/2006/relationships" xmlns:p="http://schemas.openxmlformats.org/presentationml/2006/main">
+  <p:cSld>
+    <p:spTree>
+      <p:nvGrpSpPr>
+        <p:cNvPr id="1" name=""/>
+        <p:cNvGrpSpPr/>
+        <p:nvPr/>
+      </p:nvGrpSpPr>
+      <p:grpSpPr>
+        <a:xfrm>
+          <a:off x="0" y="0"/>
+          <a:ext cx="0" cy="0"/>
+          <a:chOff x="0" y="0"/>
+          <a:chExt cx="0" cy="0"/>
+        </a:xfrm>
+      </p:grpSpPr>
+      <p:pic>
+        <p:nvPicPr>
+          <p:cNvPr id="5" name="Picture 4">
+            <a:extLst>
+              <a:ext uri="{FF2B5EF4-FFF2-40B4-BE49-F238E27FC236}">
+                <a16:creationId xmlns:a16="http://schemas.microsoft.com/office/drawing/2014/main" id="{F2B317D2-FCE7-4C7A-B97C-2824F9DF64DF}"/>
+              </a:ext>
+            </a:extLst>
+          </p:cNvPr>
+          <p:cNvPicPr>
+            <a:picLocks noChangeAspect="1"/>
+          </p:cNvPicPr>
+          <p:nvPr/>
+        </p:nvPicPr>
+        <p:blipFill>
+          <a:blip r:embed="rId3">
+            <a:extLst>
+              <a:ext uri="{28A0092B-C50C-407E-A947-70E740481C1C}">
+                <a14:useLocalDpi xmlns:a14="http://schemas.microsoft.com/office/drawing/2010/main" val="0"/>
+              </a:ext>
+            </a:extLst>
+          </a:blip>
+          <a:srcRect/>
+          <a:stretch/>
+        </p:blipFill>
+        <p:spPr>
+          <a:xfrm>
+            <a:off x="99527" y="1317655"/>
+            <a:ext cx="317019" cy="317019"/>
+          </a:xfrm>
+          <a:prstGeom prst="rect">
+            <a:avLst/>
+          </a:prstGeom>
+        </p:spPr>
+      </p:pic>
+      <p:sp>
+        <p:nvSpPr>
+          <p:cNvPr id="6" name="Rectangle 5">
+            <a:extLst>
+              <a:ext uri="{FF2B5EF4-FFF2-40B4-BE49-F238E27FC236}">
+                <a16:creationId xmlns:a16="http://schemas.microsoft.com/office/drawing/2014/main" id="{7A22CC20-CB1B-45B6-9073-B31D5751F70D}"/>
+              </a:ext>
+            </a:extLst>
+          </p:cNvPr>
+          <p:cNvSpPr/>
+          <p:nvPr/>
+        </p:nvSpPr>
+        <p:spPr>
+          <a:xfrm>
+            <a:off x="0" y="0"/>
+            <a:ext cx="1046163" cy="111967"/>
+          </a:xfrm>
+          <a:prstGeom prst="rect">
+            <a:avLst/>
+          </a:prstGeom>
+          <a:solidFill>
+            <a:srgbClr val="000000"/>
+          </a:solidFill>
+          <a:ln>
+            <a:noFill/>
+          </a:ln>
+        </p:spPr>
+        <p:style>
+          <a:lnRef idx="2">
+            <a:schemeClr val="accent1">
+              <a:shade val="50000"/>
+            </a:schemeClr>
+          </a:lnRef>
+          <a:fillRef idx="1">
+            <a:schemeClr val="accent1"/>
+          </a:fillRef>
+          <a:effectRef idx="0">
+            <a:schemeClr val="accent1"/>
+          </a:effectRef>
+          <a:fontRef idx="minor">
+            <a:schemeClr val="lt1"/>
+          </a:fontRef>
+        </p:style>
+        <p:txBody>
+          <a:bodyPr rtlCol="0" anchor="ctr"/>
+          <a:lstStyle/>
+          <a:p>
+            <a:pPr algn="ctr"/>
+            <a:r>
+              <a:rPr lang="en-GB" sz="700" dirty="0">
+                <a:solidFill>
+                  <a:schemeClr val="bg1"/>
+                </a:solidFill>
+                <a:latin typeface="Munro" panose="02000500000000000000" pitchFamily="2" charset="0"/>
+              </a:rPr>
+              <a:t>VS Code</a:t>
+            </a:r>
+          </a:p>
+        </p:txBody>
+      </p:sp>
+      <p:pic>
+        <p:nvPicPr>
+          <p:cNvPr id="12" name="Picture 11">
+            <a:extLst>
+              <a:ext uri="{FF2B5EF4-FFF2-40B4-BE49-F238E27FC236}">
+                <a16:creationId xmlns:a16="http://schemas.microsoft.com/office/drawing/2014/main" id="{C4BC1585-4688-4B34-98CF-C1AEB8C1204B}"/>
+              </a:ext>
+            </a:extLst>
+          </p:cNvPr>
+          <p:cNvPicPr>
+            <a:picLocks noChangeAspect="1"/>
+          </p:cNvPicPr>
+          <p:nvPr/>
+        </p:nvPicPr>
+        <p:blipFill>
+          <a:blip r:embed="rId4">
+            <a:extLst>
+              <a:ext uri="{28A0092B-C50C-407E-A947-70E740481C1C}">
+                <a14:useLocalDpi xmlns:a14="http://schemas.microsoft.com/office/drawing/2010/main" val="0"/>
+              </a:ext>
+            </a:extLst>
+          </a:blip>
+          <a:srcRect/>
+          <a:stretch/>
+        </p:blipFill>
+        <p:spPr>
+          <a:xfrm>
+            <a:off x="625151" y="165195"/>
+            <a:ext cx="304798" cy="304798"/>
+          </a:xfrm>
+          <a:prstGeom prst="rect">
+            <a:avLst/>
+          </a:prstGeom>
+        </p:spPr>
+      </p:pic>
+      <p:pic>
+        <p:nvPicPr>
+          <p:cNvPr id="13" name="Picture 12">
+            <a:extLst>
+              <a:ext uri="{FF2B5EF4-FFF2-40B4-BE49-F238E27FC236}">
+                <a16:creationId xmlns:a16="http://schemas.microsoft.com/office/drawing/2014/main" id="{DF6FEE83-7935-4A5E-A2FC-F073488C74E9}"/>
+              </a:ext>
+            </a:extLst>
+          </p:cNvPr>
+          <p:cNvPicPr>
+            <a:picLocks noChangeAspect="1"/>
+          </p:cNvPicPr>
+          <p:nvPr/>
+        </p:nvPicPr>
+        <p:blipFill>
+          <a:blip r:embed="rId5">
+            <a:extLst>
+              <a:ext uri="{28A0092B-C50C-407E-A947-70E740481C1C}">
+                <a14:useLocalDpi xmlns:a14="http://schemas.microsoft.com/office/drawing/2010/main" val="0"/>
+              </a:ext>
+            </a:extLst>
+          </a:blip>
+          <a:srcRect/>
+          <a:stretch/>
+        </p:blipFill>
+        <p:spPr>
+          <a:xfrm>
+            <a:off x="108163" y="737021"/>
+            <a:ext cx="299372" cy="299372"/>
+          </a:xfrm>
+          <a:prstGeom prst="rect">
+            <a:avLst/>
+          </a:prstGeom>
+        </p:spPr>
+      </p:pic>
+      <p:pic>
+        <p:nvPicPr>
+          <p:cNvPr id="14" name="Picture 13">
+            <a:extLst>
+              <a:ext uri="{FF2B5EF4-FFF2-40B4-BE49-F238E27FC236}">
+                <a16:creationId xmlns:a16="http://schemas.microsoft.com/office/drawing/2014/main" id="{BA85A372-0DC7-4278-8831-172EE01DF109}"/>
+              </a:ext>
+            </a:extLst>
+          </p:cNvPr>
+          <p:cNvPicPr>
+            <a:picLocks noChangeAspect="1"/>
+          </p:cNvPicPr>
+          <p:nvPr/>
+        </p:nvPicPr>
+        <p:blipFill>
+          <a:blip r:embed="rId6">
+            <a:extLst>
+              <a:ext uri="{28A0092B-C50C-407E-A947-70E740481C1C}">
+                <a14:useLocalDpi xmlns:a14="http://schemas.microsoft.com/office/drawing/2010/main" val="0"/>
+              </a:ext>
+            </a:extLst>
+          </a:blip>
+          <a:srcRect/>
+          <a:stretch/>
+        </p:blipFill>
+        <p:spPr>
+          <a:xfrm>
+            <a:off x="109154" y="151744"/>
+            <a:ext cx="316644" cy="316644"/>
+          </a:xfrm>
+          <a:prstGeom prst="rect">
+            <a:avLst/>
+          </a:prstGeom>
+        </p:spPr>
+      </p:pic>
+      <p:pic>
+        <p:nvPicPr>
+          <p:cNvPr id="15" name="Picture 14">
+            <a:extLst>
+              <a:ext uri="{FF2B5EF4-FFF2-40B4-BE49-F238E27FC236}">
+                <a16:creationId xmlns:a16="http://schemas.microsoft.com/office/drawing/2014/main" id="{1524E185-AD6E-47D7-B589-BC1208D9865B}"/>
+              </a:ext>
+            </a:extLst>
+          </p:cNvPr>
+          <p:cNvPicPr>
+            <a:picLocks noChangeAspect="1"/>
+          </p:cNvPicPr>
+          <p:nvPr/>
+        </p:nvPicPr>
+        <p:blipFill>
+          <a:blip r:embed="rId7">
+            <a:extLst>
+              <a:ext uri="{28A0092B-C50C-407E-A947-70E740481C1C}">
+                <a14:useLocalDpi xmlns:a14="http://schemas.microsoft.com/office/drawing/2010/main" val="0"/>
+              </a:ext>
+            </a:extLst>
+          </a:blip>
+          <a:srcRect/>
+          <a:stretch/>
+        </p:blipFill>
+        <p:spPr>
+          <a:xfrm>
+            <a:off x="607055" y="1323687"/>
+            <a:ext cx="316644" cy="316644"/>
+          </a:xfrm>
+          <a:prstGeom prst="rect">
+            <a:avLst/>
+          </a:prstGeom>
+        </p:spPr>
+      </p:pic>
+      <p:pic>
+        <p:nvPicPr>
+          <p:cNvPr id="16" name="Picture 15">
+            <a:extLst>
+              <a:ext uri="{FF2B5EF4-FFF2-40B4-BE49-F238E27FC236}">
+                <a16:creationId xmlns:a16="http://schemas.microsoft.com/office/drawing/2014/main" id="{040F4A10-B3F5-4EAB-92EB-FF21ED185811}"/>
+              </a:ext>
+            </a:extLst>
+          </p:cNvPr>
+          <p:cNvPicPr>
+            <a:picLocks noChangeAspect="1"/>
+          </p:cNvPicPr>
+          <p:nvPr/>
+        </p:nvPicPr>
+        <p:blipFill>
+          <a:blip r:embed="rId8">
+            <a:extLst>
+              <a:ext uri="{28A0092B-C50C-407E-A947-70E740481C1C}">
+                <a14:useLocalDpi xmlns:a14="http://schemas.microsoft.com/office/drawing/2010/main" val="0"/>
+              </a:ext>
+            </a:extLst>
+          </a:blip>
+          <a:srcRect/>
+          <a:stretch/>
+        </p:blipFill>
+        <p:spPr>
+          <a:xfrm>
+            <a:off x="100678" y="1905353"/>
+            <a:ext cx="316644" cy="316644"/>
+          </a:xfrm>
+          <a:prstGeom prst="rect">
+            <a:avLst/>
+          </a:prstGeom>
+        </p:spPr>
+      </p:pic>
+      <p:pic>
+        <p:nvPicPr>
+          <p:cNvPr id="17" name="Picture 16">
+            <a:extLst>
+              <a:ext uri="{FF2B5EF4-FFF2-40B4-BE49-F238E27FC236}">
+                <a16:creationId xmlns:a16="http://schemas.microsoft.com/office/drawing/2014/main" id="{E0F2F15F-87B8-400C-A3CD-E0F69975F9E9}"/>
+              </a:ext>
+            </a:extLst>
+          </p:cNvPr>
+          <p:cNvPicPr>
+            <a:picLocks noChangeAspect="1"/>
+          </p:cNvPicPr>
+          <p:nvPr/>
+        </p:nvPicPr>
+        <p:blipFill>
+          <a:blip r:embed="rId9">
+            <a:extLst>
+              <a:ext uri="{28A0092B-C50C-407E-A947-70E740481C1C}">
+                <a14:useLocalDpi xmlns:a14="http://schemas.microsoft.com/office/drawing/2010/main" val="0"/>
+              </a:ext>
+            </a:extLst>
+          </a:blip>
+          <a:srcRect/>
+          <a:stretch/>
+        </p:blipFill>
+        <p:spPr>
+          <a:xfrm>
+            <a:off x="600835" y="1919471"/>
+            <a:ext cx="316644" cy="316644"/>
+          </a:xfrm>
+          <a:prstGeom prst="rect">
+            <a:avLst/>
+          </a:prstGeom>
+        </p:spPr>
+      </p:pic>
+      <p:pic>
+        <p:nvPicPr>
+          <p:cNvPr id="18" name="Picture 17">
+            <a:extLst>
+              <a:ext uri="{FF2B5EF4-FFF2-40B4-BE49-F238E27FC236}">
+                <a16:creationId xmlns:a16="http://schemas.microsoft.com/office/drawing/2014/main" id="{6A208D98-BA40-44CF-8648-D0A8FF018C38}"/>
+              </a:ext>
+            </a:extLst>
+          </p:cNvPr>
+          <p:cNvPicPr>
+            <a:picLocks noChangeAspect="1"/>
+          </p:cNvPicPr>
+          <p:nvPr/>
+        </p:nvPicPr>
+        <p:blipFill>
+          <a:blip r:embed="rId10">
+            <a:extLst>
+              <a:ext uri="{28A0092B-C50C-407E-A947-70E740481C1C}">
+                <a14:useLocalDpi xmlns:a14="http://schemas.microsoft.com/office/drawing/2010/main" val="0"/>
+              </a:ext>
+            </a:extLst>
+          </a:blip>
+          <a:srcRect/>
+          <a:stretch/>
+        </p:blipFill>
+        <p:spPr>
+          <a:xfrm>
+            <a:off x="612711" y="736364"/>
+            <a:ext cx="316644" cy="316644"/>
+          </a:xfrm>
+          <a:prstGeom prst="rect">
+            <a:avLst/>
+          </a:prstGeom>
+        </p:spPr>
+      </p:pic>
+      <p:sp>
+        <p:nvSpPr>
+          <p:cNvPr id="19" name="TextBox 18">
+            <a:extLst>
+              <a:ext uri="{FF2B5EF4-FFF2-40B4-BE49-F238E27FC236}">
+                <a16:creationId xmlns:a16="http://schemas.microsoft.com/office/drawing/2014/main" id="{4559ACFF-7146-43CE-AEE7-0FE76885A4A1}"/>
+              </a:ext>
+            </a:extLst>
+          </p:cNvPr>
+          <p:cNvSpPr txBox="1"/>
+          <p:nvPr/>
+        </p:nvSpPr>
+        <p:spPr>
+          <a:xfrm>
+            <a:off x="0" y="2229976"/>
+            <a:ext cx="1046163" cy="200055"/>
+          </a:xfrm>
+          <a:prstGeom prst="rect">
+            <a:avLst/>
+          </a:prstGeom>
+          <a:noFill/>
+        </p:spPr>
+        <p:txBody>
+          <a:bodyPr wrap="square" rtlCol="0">
+            <a:spAutoFit/>
+          </a:bodyPr>
+          <a:lstStyle/>
+          <a:p>
+            <a:pPr algn="ctr"/>
+            <a:r>
+              <a:rPr lang="en-GB" sz="700" dirty="0">
+                <a:latin typeface="Munro" panose="02000500000000000000" pitchFamily="2" charset="0"/>
+              </a:rPr>
+              <a:t>Cycle Tab</a:t>
+            </a:r>
+          </a:p>
+        </p:txBody>
+      </p:sp>
+    </p:spTree>
+    <p:extLst>
+      <p:ext uri="{BB962C8B-B14F-4D97-AF65-F5344CB8AC3E}">
+        <p14:creationId xmlns:p14="http://schemas.microsoft.com/office/powerpoint/2010/main" val="3498001712"/>
+      </p:ext>
+    </p:extLst>
+  </p:cSld>
+  <p:clrMapOvr>
+    <a:masterClrMapping/>
+  </p:clrMapOvr>
+</p:sld>
+</file>
+
+<file path=ppt/slides/slide6.xml><?xml version="1.0" encoding="utf-8"?>
 <p:sld xmlns:a="http://schemas.openxmlformats.org/drawingml/2006/main" xmlns:r="http://schemas.openxmlformats.org/officeDocument/2006/relationships" xmlns:p="http://schemas.openxmlformats.org/presentationml/2006/main">
   <p:cSld>
     <p:spTree>

</xml_diff>

<commit_message>
Added Word Review Mode and added to VSCodeMode
</commit_message>
<xml_diff>
--- a/Template.pptx
+++ b/Template.pptx
@@ -5,7 +5,7 @@
     <p:sldMasterId id="2147483660" r:id="rId1"/>
   </p:sldMasterIdLst>
   <p:notesMasterIdLst>
-    <p:notesMasterId r:id="rId8"/>
+    <p:notesMasterId r:id="rId9"/>
   </p:notesMasterIdLst>
   <p:sldIdLst>
     <p:sldId id="256" r:id="rId2"/>
@@ -14,6 +14,7 @@
     <p:sldId id="259" r:id="rId5"/>
     <p:sldId id="261" r:id="rId6"/>
     <p:sldId id="260" r:id="rId7"/>
+    <p:sldId id="262" r:id="rId8"/>
   </p:sldIdLst>
   <p:sldSz cx="1046163" cy="2408238"/>
   <p:notesSz cx="6858000" cy="9144000"/>
@@ -8548,12 +8549,15 @@
                 <a:spcPts val="800"/>
               </a:spcAft>
             </a:pPr>
-            <a:endParaRPr lang="en-GB" sz="1800" dirty="0">
-              <a:effectLst/>
-              <a:latin typeface="Calibri" panose="020F0502020204030204" pitchFamily="34" charset="0"/>
-              <a:ea typeface="Yu Mincho" panose="02020400000000000000" pitchFamily="18" charset="-128"/>
-              <a:cs typeface="Arial" panose="020B0604020202020204" pitchFamily="34" charset="0"/>
-            </a:endParaRPr>
+            <a:r>
+              <a:rPr lang="en-GB" sz="1800" dirty="0">
+                <a:effectLst/>
+                <a:latin typeface="Calibri" panose="020F0502020204030204" pitchFamily="34" charset="0"/>
+                <a:ea typeface="Yu Mincho" panose="02020400000000000000" pitchFamily="18" charset="-128"/>
+                <a:cs typeface="Arial" panose="020B0604020202020204" pitchFamily="34" charset="0"/>
+              </a:rPr>
+              <a:t>Amusingly unlikely to work</a:t>
+            </a:r>
           </a:p>
         </p:txBody>
       </p:sp>
@@ -8972,6 +8976,63 @@
                 <a:spcPts val="800"/>
               </a:spcAft>
             </a:pPr>
+            <a:r>
+              <a:rPr lang="en-GB" sz="1800" dirty="0">
+                <a:effectLst/>
+                <a:latin typeface="Calibri" panose="020F0502020204030204" pitchFamily="34" charset="0"/>
+                <a:ea typeface="Yu Mincho" panose="02020400000000000000" pitchFamily="18" charset="-128"/>
+                <a:cs typeface="Arial" panose="020B0604020202020204" pitchFamily="34" charset="0"/>
+              </a:rPr>
+              <a:t>Keyboard Interrupt {Ctrl + C}</a:t>
+            </a:r>
+          </a:p>
+          <a:p>
+            <a:pPr>
+              <a:lnSpc>
+                <a:spcPct val="107000"/>
+              </a:lnSpc>
+              <a:spcAft>
+                <a:spcPts val="800"/>
+              </a:spcAft>
+            </a:pPr>
+            <a:r>
+              <a:rPr lang="en-GB" sz="1800" dirty="0">
+                <a:effectLst/>
+                <a:latin typeface="Calibri" panose="020F0502020204030204" pitchFamily="34" charset="0"/>
+                <a:ea typeface="Yu Mincho" panose="02020400000000000000" pitchFamily="18" charset="-128"/>
+                <a:cs typeface="Arial" panose="020B0604020202020204" pitchFamily="34" charset="0"/>
+              </a:rPr>
+              <a:t>Save {Ctrl + C}</a:t>
+            </a:r>
+          </a:p>
+          <a:p>
+            <a:pPr>
+              <a:lnSpc>
+                <a:spcPct val="107000"/>
+              </a:lnSpc>
+              <a:spcAft>
+                <a:spcPts val="800"/>
+              </a:spcAft>
+            </a:pPr>
+            <a:r>
+              <a:rPr lang="en-GB" sz="1800" dirty="0">
+                <a:effectLst/>
+                <a:latin typeface="Calibri" panose="020F0502020204030204" pitchFamily="34" charset="0"/>
+                <a:ea typeface="Yu Mincho" panose="02020400000000000000" pitchFamily="18" charset="-128"/>
+                <a:cs typeface="Arial" panose="020B0604020202020204" pitchFamily="34" charset="0"/>
+              </a:rPr>
+              <a:t>Commit {Ctrl + Shift + G, Pg Up}</a:t>
+            </a:r>
+          </a:p>
+          <a:p>
+            <a:pPr>
+              <a:lnSpc>
+                <a:spcPct val="107000"/>
+              </a:lnSpc>
+              <a:spcAft>
+                <a:spcPts val="800"/>
+              </a:spcAft>
+            </a:pPr>
             <a:endParaRPr lang="en-GB" sz="1800" dirty="0">
               <a:effectLst/>
               <a:latin typeface="Calibri" panose="020F0502020204030204" pitchFamily="34" charset="0"/>
@@ -9076,140 +9137,140 @@
                 <a:ea typeface="Yu Mincho" panose="02020400000000000000" pitchFamily="18" charset="-128"/>
                 <a:cs typeface="Arial" panose="020B0604020202020204" pitchFamily="34" charset="0"/>
               </a:rPr>
-              <a:t>New Comment {Ctrl + Alt + M}</a:t>
-            </a:r>
-          </a:p>
-          <a:p>
-            <a:pPr>
-              <a:lnSpc>
-                <a:spcPct val="107000"/>
-              </a:lnSpc>
-              <a:spcAft>
-                <a:spcPts val="800"/>
-              </a:spcAft>
-            </a:pPr>
-            <a:r>
-              <a:rPr lang="en-GB" sz="1800" dirty="0">
-                <a:effectLst/>
-                <a:latin typeface="Calibri" panose="020F0502020204030204" pitchFamily="34" charset="0"/>
-                <a:ea typeface="Yu Mincho" panose="02020400000000000000" pitchFamily="18" charset="-128"/>
-                <a:cs typeface="Arial" panose="020B0604020202020204" pitchFamily="34" charset="0"/>
-              </a:rPr>
-              <a:t>Delete Comment {Alt, R. D, D}</a:t>
-            </a:r>
-          </a:p>
-          <a:p>
-            <a:pPr>
-              <a:lnSpc>
-                <a:spcPct val="107000"/>
-              </a:lnSpc>
-              <a:spcAft>
-                <a:spcPts val="800"/>
-              </a:spcAft>
-            </a:pPr>
-            <a:r>
-              <a:rPr lang="en-GB" sz="1800" dirty="0">
-                <a:effectLst/>
-                <a:latin typeface="Calibri" panose="020F0502020204030204" pitchFamily="34" charset="0"/>
-                <a:ea typeface="Yu Mincho" panose="02020400000000000000" pitchFamily="18" charset="-128"/>
-                <a:cs typeface="Arial" panose="020B0604020202020204" pitchFamily="34" charset="0"/>
-              </a:rPr>
-              <a:t>Previous Comment {Alt, R, V}</a:t>
-            </a:r>
-          </a:p>
-          <a:p>
-            <a:pPr>
-              <a:lnSpc>
-                <a:spcPct val="107000"/>
-              </a:lnSpc>
-              <a:spcAft>
-                <a:spcPts val="800"/>
-              </a:spcAft>
-            </a:pPr>
-            <a:r>
-              <a:rPr lang="en-GB" sz="1800" dirty="0">
-                <a:effectLst/>
-                <a:latin typeface="Calibri" panose="020F0502020204030204" pitchFamily="34" charset="0"/>
-                <a:ea typeface="Yu Mincho" panose="02020400000000000000" pitchFamily="18" charset="-128"/>
-                <a:cs typeface="Arial" panose="020B0604020202020204" pitchFamily="34" charset="0"/>
-              </a:rPr>
-              <a:t>Next Comment {Alt, R, N}</a:t>
-            </a:r>
-          </a:p>
-          <a:p>
-            <a:pPr>
-              <a:lnSpc>
-                <a:spcPct val="107000"/>
-              </a:lnSpc>
-              <a:spcAft>
-                <a:spcPts val="800"/>
-              </a:spcAft>
-            </a:pPr>
-            <a:r>
-              <a:rPr lang="en-GB" sz="1800" dirty="0">
-                <a:effectLst/>
-                <a:latin typeface="Calibri" panose="020F0502020204030204" pitchFamily="34" charset="0"/>
-                <a:ea typeface="Yu Mincho" panose="02020400000000000000" pitchFamily="18" charset="-128"/>
-                <a:cs typeface="Arial" panose="020B0604020202020204" pitchFamily="34" charset="0"/>
-              </a:rPr>
-              <a:t>Accept Change {Alt, R, A2, M}</a:t>
-            </a:r>
-          </a:p>
-          <a:p>
-            <a:pPr>
-              <a:lnSpc>
-                <a:spcPct val="107000"/>
-              </a:lnSpc>
-              <a:spcAft>
-                <a:spcPts val="800"/>
-              </a:spcAft>
-            </a:pPr>
-            <a:r>
-              <a:rPr lang="en-GB" sz="1800" dirty="0">
-                <a:effectLst/>
-                <a:latin typeface="Calibri" panose="020F0502020204030204" pitchFamily="34" charset="0"/>
-                <a:ea typeface="Yu Mincho" panose="02020400000000000000" pitchFamily="18" charset="-128"/>
-                <a:cs typeface="Arial" panose="020B0604020202020204" pitchFamily="34" charset="0"/>
-              </a:rPr>
-              <a:t>Next Change {A, R, H1}</a:t>
-            </a:r>
-          </a:p>
-          <a:p>
-            <a:pPr>
-              <a:lnSpc>
-                <a:spcPct val="107000"/>
-              </a:lnSpc>
-              <a:spcAft>
-                <a:spcPts val="800"/>
-              </a:spcAft>
-            </a:pPr>
-            <a:r>
-              <a:rPr lang="en-GB" sz="1800" dirty="0">
-                <a:effectLst/>
-                <a:latin typeface="Calibri" panose="020F0502020204030204" pitchFamily="34" charset="0"/>
-                <a:ea typeface="Yu Mincho" panose="02020400000000000000" pitchFamily="18" charset="-128"/>
-                <a:cs typeface="Arial" panose="020B0604020202020204" pitchFamily="34" charset="0"/>
-              </a:rPr>
-              <a:t>Reject Change {Alt, R, J, M}</a:t>
-            </a:r>
-          </a:p>
-          <a:p>
-            <a:pPr>
-              <a:lnSpc>
-                <a:spcPct val="107000"/>
-              </a:lnSpc>
-              <a:spcAft>
-                <a:spcPts val="800"/>
-              </a:spcAft>
-            </a:pPr>
-            <a:r>
-              <a:rPr lang="en-GB" sz="1800" dirty="0">
-                <a:effectLst/>
-                <a:latin typeface="Calibri" panose="020F0502020204030204" pitchFamily="34" charset="0"/>
-                <a:ea typeface="Yu Mincho" panose="02020400000000000000" pitchFamily="18" charset="-128"/>
-                <a:cs typeface="Arial" panose="020B0604020202020204" pitchFamily="34" charset="0"/>
-              </a:rPr>
-              <a:t>Accept All {Alt, R, A2, L}</a:t>
+              <a:t>2. New Comment {Ctrl + Alt + M}</a:t>
+            </a:r>
+          </a:p>
+          <a:p>
+            <a:pPr>
+              <a:lnSpc>
+                <a:spcPct val="107000"/>
+              </a:lnSpc>
+              <a:spcAft>
+                <a:spcPts val="800"/>
+              </a:spcAft>
+            </a:pPr>
+            <a:r>
+              <a:rPr lang="en-GB" sz="1800" dirty="0">
+                <a:effectLst/>
+                <a:latin typeface="Calibri" panose="020F0502020204030204" pitchFamily="34" charset="0"/>
+                <a:ea typeface="Yu Mincho" panose="02020400000000000000" pitchFamily="18" charset="-128"/>
+                <a:cs typeface="Arial" panose="020B0604020202020204" pitchFamily="34" charset="0"/>
+              </a:rPr>
+              <a:t>6. Delete Comment {Alt, R, D, D}</a:t>
+            </a:r>
+          </a:p>
+          <a:p>
+            <a:pPr>
+              <a:lnSpc>
+                <a:spcPct val="107000"/>
+              </a:lnSpc>
+              <a:spcAft>
+                <a:spcPts val="800"/>
+              </a:spcAft>
+            </a:pPr>
+            <a:r>
+              <a:rPr lang="en-GB" sz="1800" dirty="0">
+                <a:effectLst/>
+                <a:latin typeface="Calibri" panose="020F0502020204030204" pitchFamily="34" charset="0"/>
+                <a:ea typeface="Yu Mincho" panose="02020400000000000000" pitchFamily="18" charset="-128"/>
+                <a:cs typeface="Arial" panose="020B0604020202020204" pitchFamily="34" charset="0"/>
+              </a:rPr>
+              <a:t>3. Previous Comment {Alt, R, V}</a:t>
+            </a:r>
+          </a:p>
+          <a:p>
+            <a:pPr>
+              <a:lnSpc>
+                <a:spcPct val="107000"/>
+              </a:lnSpc>
+              <a:spcAft>
+                <a:spcPts val="800"/>
+              </a:spcAft>
+            </a:pPr>
+            <a:r>
+              <a:rPr lang="en-GB" sz="1800" dirty="0">
+                <a:effectLst/>
+                <a:latin typeface="Calibri" panose="020F0502020204030204" pitchFamily="34" charset="0"/>
+                <a:ea typeface="Yu Mincho" panose="02020400000000000000" pitchFamily="18" charset="-128"/>
+                <a:cs typeface="Arial" panose="020B0604020202020204" pitchFamily="34" charset="0"/>
+              </a:rPr>
+              <a:t>7. Next Comment {Alt, R, N}</a:t>
+            </a:r>
+          </a:p>
+          <a:p>
+            <a:pPr>
+              <a:lnSpc>
+                <a:spcPct val="107000"/>
+              </a:lnSpc>
+              <a:spcAft>
+                <a:spcPts val="800"/>
+              </a:spcAft>
+            </a:pPr>
+            <a:r>
+              <a:rPr lang="en-GB" sz="1800" dirty="0">
+                <a:effectLst/>
+                <a:latin typeface="Calibri" panose="020F0502020204030204" pitchFamily="34" charset="0"/>
+                <a:ea typeface="Yu Mincho" panose="02020400000000000000" pitchFamily="18" charset="-128"/>
+                <a:cs typeface="Arial" panose="020B0604020202020204" pitchFamily="34" charset="0"/>
+              </a:rPr>
+              <a:t>4. Accept Change {Alt, R, A2, M}</a:t>
+            </a:r>
+          </a:p>
+          <a:p>
+            <a:pPr>
+              <a:lnSpc>
+                <a:spcPct val="107000"/>
+              </a:lnSpc>
+              <a:spcAft>
+                <a:spcPts val="800"/>
+              </a:spcAft>
+            </a:pPr>
+            <a:r>
+              <a:rPr lang="en-GB" sz="1800" dirty="0">
+                <a:effectLst/>
+                <a:latin typeface="Calibri" panose="020F0502020204030204" pitchFamily="34" charset="0"/>
+                <a:ea typeface="Yu Mincho" panose="02020400000000000000" pitchFamily="18" charset="-128"/>
+                <a:cs typeface="Arial" panose="020B0604020202020204" pitchFamily="34" charset="0"/>
+              </a:rPr>
+              <a:t>8. Next Change {Alt, R, H1}</a:t>
+            </a:r>
+          </a:p>
+          <a:p>
+            <a:pPr>
+              <a:lnSpc>
+                <a:spcPct val="107000"/>
+              </a:lnSpc>
+              <a:spcAft>
+                <a:spcPts val="800"/>
+              </a:spcAft>
+            </a:pPr>
+            <a:r>
+              <a:rPr lang="en-GB" sz="1800" dirty="0">
+                <a:effectLst/>
+                <a:latin typeface="Calibri" panose="020F0502020204030204" pitchFamily="34" charset="0"/>
+                <a:ea typeface="Yu Mincho" panose="02020400000000000000" pitchFamily="18" charset="-128"/>
+                <a:cs typeface="Arial" panose="020B0604020202020204" pitchFamily="34" charset="0"/>
+              </a:rPr>
+              <a:t>5. Reject Change {Alt, R, J, M}</a:t>
+            </a:r>
+          </a:p>
+          <a:p>
+            <a:pPr>
+              <a:lnSpc>
+                <a:spcPct val="107000"/>
+              </a:lnSpc>
+              <a:spcAft>
+                <a:spcPts val="800"/>
+              </a:spcAft>
+            </a:pPr>
+            <a:r>
+              <a:rPr lang="en-GB" sz="1800" dirty="0">
+                <a:effectLst/>
+                <a:latin typeface="Calibri" panose="020F0502020204030204" pitchFamily="34" charset="0"/>
+                <a:ea typeface="Yu Mincho" panose="02020400000000000000" pitchFamily="18" charset="-128"/>
+                <a:cs typeface="Arial" panose="020B0604020202020204" pitchFamily="34" charset="0"/>
+              </a:rPr>
+              <a:t>9. Accept All {Alt, R, A2, L}</a:t>
             </a:r>
           </a:p>
         </p:txBody>
@@ -9241,6 +9302,290 @@
     <p:extLst>
       <p:ext uri="{BB962C8B-B14F-4D97-AF65-F5344CB8AC3E}">
         <p14:creationId xmlns:p14="http://schemas.microsoft.com/office/powerpoint/2010/main" val="181250959"/>
+      </p:ext>
+    </p:extLst>
+  </p:cSld>
+  <p:clrMapOvr>
+    <a:masterClrMapping/>
+  </p:clrMapOvr>
+</p:notes>
+</file>
+
+<file path=ppt/notesSlides/notesSlide7.xml><?xml version="1.0" encoding="utf-8"?>
+<p:notes xmlns:a="http://schemas.openxmlformats.org/drawingml/2006/main" xmlns:r="http://schemas.openxmlformats.org/officeDocument/2006/relationships" xmlns:p="http://schemas.openxmlformats.org/presentationml/2006/main">
+  <p:cSld>
+    <p:spTree>
+      <p:nvGrpSpPr>
+        <p:cNvPr id="1" name=""/>
+        <p:cNvGrpSpPr/>
+        <p:nvPr/>
+      </p:nvGrpSpPr>
+      <p:grpSpPr>
+        <a:xfrm>
+          <a:off x="0" y="0"/>
+          <a:ext cx="0" cy="0"/>
+          <a:chOff x="0" y="0"/>
+          <a:chExt cx="0" cy="0"/>
+        </a:xfrm>
+      </p:grpSpPr>
+      <p:sp>
+        <p:nvSpPr>
+          <p:cNvPr id="2" name="Slide Image Placeholder 1"/>
+          <p:cNvSpPr>
+            <a:spLocks noGrp="1" noRot="1" noChangeAspect="1"/>
+          </p:cNvSpPr>
+          <p:nvPr>
+            <p:ph type="sldImg"/>
+          </p:nvPr>
+        </p:nvSpPr>
+        <p:spPr/>
+      </p:sp>
+      <p:sp>
+        <p:nvSpPr>
+          <p:cNvPr id="3" name="Notes Placeholder 2"/>
+          <p:cNvSpPr>
+            <a:spLocks noGrp="1"/>
+          </p:cNvSpPr>
+          <p:nvPr>
+            <p:ph type="body" idx="1"/>
+          </p:nvPr>
+        </p:nvSpPr>
+        <p:spPr/>
+        <p:txBody>
+          <a:bodyPr/>
+          <a:lstStyle/>
+          <a:p>
+            <a:pPr>
+              <a:lnSpc>
+                <a:spcPct val="107000"/>
+              </a:lnSpc>
+              <a:spcAft>
+                <a:spcPts val="800"/>
+              </a:spcAft>
+            </a:pPr>
+            <a:endParaRPr lang="en-GB" sz="1800" dirty="0">
+              <a:effectLst/>
+              <a:latin typeface="Calibri" panose="020F0502020204030204" pitchFamily="34" charset="0"/>
+              <a:ea typeface="Yu Mincho" panose="02020400000000000000" pitchFamily="18" charset="-128"/>
+              <a:cs typeface="Arial" panose="020B0604020202020204" pitchFamily="34" charset="0"/>
+            </a:endParaRPr>
+          </a:p>
+          <a:p>
+            <a:pPr>
+              <a:lnSpc>
+                <a:spcPct val="107000"/>
+              </a:lnSpc>
+              <a:spcAft>
+                <a:spcPts val="800"/>
+              </a:spcAft>
+            </a:pPr>
+            <a:r>
+              <a:rPr lang="en-GB" sz="1800" dirty="0">
+                <a:effectLst/>
+                <a:latin typeface="Calibri" panose="020F0502020204030204" pitchFamily="34" charset="0"/>
+                <a:ea typeface="Yu Mincho" panose="02020400000000000000" pitchFamily="18" charset="-128"/>
+                <a:cs typeface="Arial" panose="020B0604020202020204" pitchFamily="34" charset="0"/>
+              </a:rPr>
+              <a:t>Save As {F12}</a:t>
+            </a:r>
+          </a:p>
+          <a:p>
+            <a:pPr>
+              <a:lnSpc>
+                <a:spcPct val="107000"/>
+              </a:lnSpc>
+              <a:spcAft>
+                <a:spcPts val="800"/>
+              </a:spcAft>
+            </a:pPr>
+            <a:r>
+              <a:rPr lang="en-GB" sz="1800" dirty="0">
+                <a:effectLst/>
+                <a:latin typeface="Calibri" panose="020F0502020204030204" pitchFamily="34" charset="0"/>
+                <a:ea typeface="Yu Mincho" panose="02020400000000000000" pitchFamily="18" charset="-128"/>
+                <a:cs typeface="Arial" panose="020B0604020202020204" pitchFamily="34" charset="0"/>
+              </a:rPr>
+              <a:t>Copy Link {Alt, ZS, C}</a:t>
+            </a:r>
+          </a:p>
+          <a:p>
+            <a:pPr>
+              <a:lnSpc>
+                <a:spcPct val="107000"/>
+              </a:lnSpc>
+              <a:spcAft>
+                <a:spcPts val="800"/>
+              </a:spcAft>
+            </a:pPr>
+            <a:r>
+              <a:rPr lang="en-GB" sz="1800" dirty="0">
+                <a:effectLst/>
+                <a:latin typeface="Calibri" panose="020F0502020204030204" pitchFamily="34" charset="0"/>
+                <a:ea typeface="Yu Mincho" panose="02020400000000000000" pitchFamily="18" charset="-128"/>
+                <a:cs typeface="Arial" panose="020B0604020202020204" pitchFamily="34" charset="0"/>
+              </a:rPr>
+              <a:t>Indents and Spacing {Alt, H, PG}</a:t>
+            </a:r>
+          </a:p>
+          <a:p>
+            <a:pPr>
+              <a:lnSpc>
+                <a:spcPct val="107000"/>
+              </a:lnSpc>
+              <a:spcAft>
+                <a:spcPts val="800"/>
+              </a:spcAft>
+            </a:pPr>
+            <a:r>
+              <a:rPr lang="en-GB" sz="1800" dirty="0">
+                <a:effectLst/>
+                <a:latin typeface="Calibri" panose="020F0502020204030204" pitchFamily="34" charset="0"/>
+                <a:ea typeface="Yu Mincho" panose="02020400000000000000" pitchFamily="18" charset="-128"/>
+                <a:cs typeface="Arial" panose="020B0604020202020204" pitchFamily="34" charset="0"/>
+              </a:rPr>
+              <a:t>Column {Alt, P, J, C}</a:t>
+            </a:r>
+          </a:p>
+          <a:p>
+            <a:pPr>
+              <a:lnSpc>
+                <a:spcPct val="107000"/>
+              </a:lnSpc>
+              <a:spcAft>
+                <a:spcPts val="800"/>
+              </a:spcAft>
+            </a:pPr>
+            <a:r>
+              <a:rPr lang="en-GB" sz="1800" dirty="0">
+                <a:effectLst/>
+                <a:latin typeface="Calibri" panose="020F0502020204030204" pitchFamily="34" charset="0"/>
+                <a:ea typeface="Yu Mincho" panose="02020400000000000000" pitchFamily="18" charset="-128"/>
+                <a:cs typeface="Arial" panose="020B0604020202020204" pitchFamily="34" charset="0"/>
+              </a:rPr>
+              <a:t>Page Break {Ctrl + Enter}</a:t>
+            </a:r>
+          </a:p>
+          <a:p>
+            <a:pPr>
+              <a:lnSpc>
+                <a:spcPct val="107000"/>
+              </a:lnSpc>
+              <a:spcAft>
+                <a:spcPts val="800"/>
+              </a:spcAft>
+            </a:pPr>
+            <a:r>
+              <a:rPr lang="en-GB" sz="1800" dirty="0">
+                <a:effectLst/>
+                <a:latin typeface="Calibri" panose="020F0502020204030204" pitchFamily="34" charset="0"/>
+                <a:ea typeface="Yu Mincho" panose="02020400000000000000" pitchFamily="18" charset="-128"/>
+                <a:cs typeface="Arial" panose="020B0604020202020204" pitchFamily="34" charset="0"/>
+              </a:rPr>
+              <a:t>Section Break (Same Page) {Alt, P, B, C}</a:t>
+            </a:r>
+          </a:p>
+          <a:p>
+            <a:pPr>
+              <a:lnSpc>
+                <a:spcPct val="107000"/>
+              </a:lnSpc>
+              <a:spcAft>
+                <a:spcPts val="800"/>
+              </a:spcAft>
+            </a:pPr>
+            <a:r>
+              <a:rPr lang="en-GB" sz="1800" dirty="0">
+                <a:effectLst/>
+                <a:latin typeface="Calibri" panose="020F0502020204030204" pitchFamily="34" charset="0"/>
+                <a:ea typeface="Yu Mincho" panose="02020400000000000000" pitchFamily="18" charset="-128"/>
+                <a:cs typeface="Arial" panose="020B0604020202020204" pitchFamily="34" charset="0"/>
+              </a:rPr>
+              <a:t>Insert Symbol {Alt, N, U, M}</a:t>
+            </a:r>
+          </a:p>
+          <a:p>
+            <a:pPr>
+              <a:lnSpc>
+                <a:spcPct val="107000"/>
+              </a:lnSpc>
+              <a:spcAft>
+                <a:spcPts val="800"/>
+              </a:spcAft>
+            </a:pPr>
+            <a:r>
+              <a:rPr lang="en-GB" sz="1800" dirty="0">
+                <a:effectLst/>
+                <a:latin typeface="Calibri" panose="020F0502020204030204" pitchFamily="34" charset="0"/>
+                <a:ea typeface="Yu Mincho" panose="02020400000000000000" pitchFamily="18" charset="-128"/>
+                <a:cs typeface="Arial" panose="020B0604020202020204" pitchFamily="34" charset="0"/>
+              </a:rPr>
+              <a:t>Highlight {Shift Down} [On Release]{Ctrl + Alt + H}</a:t>
+            </a:r>
+          </a:p>
+          <a:p>
+            <a:pPr>
+              <a:lnSpc>
+                <a:spcPct val="107000"/>
+              </a:lnSpc>
+              <a:spcAft>
+                <a:spcPts val="800"/>
+              </a:spcAft>
+            </a:pPr>
+            <a:endParaRPr lang="en-GB" sz="1800" dirty="0">
+              <a:effectLst/>
+              <a:latin typeface="Calibri" panose="020F0502020204030204" pitchFamily="34" charset="0"/>
+              <a:ea typeface="Yu Mincho" panose="02020400000000000000" pitchFamily="18" charset="-128"/>
+              <a:cs typeface="Arial" panose="020B0604020202020204" pitchFamily="34" charset="0"/>
+            </a:endParaRPr>
+          </a:p>
+          <a:p>
+            <a:pPr>
+              <a:lnSpc>
+                <a:spcPct val="107000"/>
+              </a:lnSpc>
+              <a:spcAft>
+                <a:spcPts val="800"/>
+              </a:spcAft>
+            </a:pPr>
+            <a:r>
+              <a:rPr lang="en-GB" sz="1800" dirty="0">
+                <a:effectLst/>
+                <a:latin typeface="Calibri" panose="020F0502020204030204" pitchFamily="34" charset="0"/>
+                <a:ea typeface="Yu Mincho" panose="02020400000000000000" pitchFamily="18" charset="-128"/>
+                <a:cs typeface="Arial" panose="020B0604020202020204" pitchFamily="34" charset="0"/>
+              </a:rPr>
+              <a:t>Scroll Lines</a:t>
+            </a:r>
+          </a:p>
+        </p:txBody>
+      </p:sp>
+      <p:sp>
+        <p:nvSpPr>
+          <p:cNvPr id="4" name="Slide Number Placeholder 3"/>
+          <p:cNvSpPr>
+            <a:spLocks noGrp="1"/>
+          </p:cNvSpPr>
+          <p:nvPr>
+            <p:ph type="sldNum" sz="quarter" idx="5"/>
+          </p:nvPr>
+        </p:nvSpPr>
+        <p:spPr/>
+        <p:txBody>
+          <a:bodyPr/>
+          <a:lstStyle/>
+          <a:p>
+            <a:fld id="{AD72BDD0-34C8-4178-8D35-D94E7CA1241E}" type="slidenum">
+              <a:rPr lang="en-GB" smtClean="0"/>
+              <a:t>7</a:t>
+            </a:fld>
+            <a:endParaRPr lang="en-GB"/>
+          </a:p>
+        </p:txBody>
+      </p:sp>
+    </p:spTree>
+    <p:extLst>
+      <p:ext uri="{BB962C8B-B14F-4D97-AF65-F5344CB8AC3E}">
+        <p14:creationId xmlns:p14="http://schemas.microsoft.com/office/powerpoint/2010/main" val="823879280"/>
       </p:ext>
     </p:extLst>
   </p:cSld>
@@ -15214,6 +15559,414 @@
     <p:extLst>
       <p:ext uri="{BB962C8B-B14F-4D97-AF65-F5344CB8AC3E}">
         <p14:creationId xmlns:p14="http://schemas.microsoft.com/office/powerpoint/2010/main" val="3378545864"/>
+      </p:ext>
+    </p:extLst>
+  </p:cSld>
+  <p:clrMapOvr>
+    <a:masterClrMapping/>
+  </p:clrMapOvr>
+</p:sld>
+</file>
+
+<file path=ppt/slides/slide7.xml><?xml version="1.0" encoding="utf-8"?>
+<p:sld xmlns:a="http://schemas.openxmlformats.org/drawingml/2006/main" xmlns:r="http://schemas.openxmlformats.org/officeDocument/2006/relationships" xmlns:p="http://schemas.openxmlformats.org/presentationml/2006/main">
+  <p:cSld>
+    <p:spTree>
+      <p:nvGrpSpPr>
+        <p:cNvPr id="1" name=""/>
+        <p:cNvGrpSpPr/>
+        <p:nvPr/>
+      </p:nvGrpSpPr>
+      <p:grpSpPr>
+        <a:xfrm>
+          <a:off x="0" y="0"/>
+          <a:ext cx="0" cy="0"/>
+          <a:chOff x="0" y="0"/>
+          <a:chExt cx="0" cy="0"/>
+        </a:xfrm>
+      </p:grpSpPr>
+      <p:pic>
+        <p:nvPicPr>
+          <p:cNvPr id="5" name="Picture 4">
+            <a:extLst>
+              <a:ext uri="{FF2B5EF4-FFF2-40B4-BE49-F238E27FC236}">
+                <a16:creationId xmlns:a16="http://schemas.microsoft.com/office/drawing/2014/main" id="{F2B317D2-FCE7-4C7A-B97C-2824F9DF64DF}"/>
+              </a:ext>
+            </a:extLst>
+          </p:cNvPr>
+          <p:cNvPicPr>
+            <a:picLocks noChangeAspect="1"/>
+          </p:cNvPicPr>
+          <p:nvPr/>
+        </p:nvPicPr>
+        <p:blipFill>
+          <a:blip r:embed="rId3">
+            <a:extLst>
+              <a:ext uri="{28A0092B-C50C-407E-A947-70E740481C1C}">
+                <a14:useLocalDpi xmlns:a14="http://schemas.microsoft.com/office/drawing/2010/main" val="0"/>
+              </a:ext>
+            </a:extLst>
+          </a:blip>
+          <a:srcRect/>
+          <a:stretch/>
+        </p:blipFill>
+        <p:spPr>
+          <a:xfrm>
+            <a:off x="99527" y="1317655"/>
+            <a:ext cx="317019" cy="317019"/>
+          </a:xfrm>
+          <a:prstGeom prst="rect">
+            <a:avLst/>
+          </a:prstGeom>
+        </p:spPr>
+      </p:pic>
+      <p:sp>
+        <p:nvSpPr>
+          <p:cNvPr id="6" name="Rectangle 5">
+            <a:extLst>
+              <a:ext uri="{FF2B5EF4-FFF2-40B4-BE49-F238E27FC236}">
+                <a16:creationId xmlns:a16="http://schemas.microsoft.com/office/drawing/2014/main" id="{7A22CC20-CB1B-45B6-9073-B31D5751F70D}"/>
+              </a:ext>
+            </a:extLst>
+          </p:cNvPr>
+          <p:cNvSpPr/>
+          <p:nvPr/>
+        </p:nvSpPr>
+        <p:spPr>
+          <a:xfrm>
+            <a:off x="0" y="0"/>
+            <a:ext cx="1046163" cy="111967"/>
+          </a:xfrm>
+          <a:prstGeom prst="rect">
+            <a:avLst/>
+          </a:prstGeom>
+          <a:solidFill>
+            <a:srgbClr val="000000"/>
+          </a:solidFill>
+          <a:ln>
+            <a:noFill/>
+          </a:ln>
+        </p:spPr>
+        <p:style>
+          <a:lnRef idx="2">
+            <a:schemeClr val="accent1">
+              <a:shade val="50000"/>
+            </a:schemeClr>
+          </a:lnRef>
+          <a:fillRef idx="1">
+            <a:schemeClr val="accent1"/>
+          </a:fillRef>
+          <a:effectRef idx="0">
+            <a:schemeClr val="accent1"/>
+          </a:effectRef>
+          <a:fontRef idx="minor">
+            <a:schemeClr val="lt1"/>
+          </a:fontRef>
+        </p:style>
+        <p:txBody>
+          <a:bodyPr rtlCol="0" anchor="ctr"/>
+          <a:lstStyle/>
+          <a:p>
+            <a:pPr algn="ctr"/>
+            <a:r>
+              <a:rPr lang="en-GB" sz="700" dirty="0">
+                <a:solidFill>
+                  <a:schemeClr val="bg1"/>
+                </a:solidFill>
+                <a:latin typeface="Munro" panose="02000500000000000000" pitchFamily="2" charset="0"/>
+              </a:rPr>
+              <a:t>Word (Default)</a:t>
+            </a:r>
+          </a:p>
+        </p:txBody>
+      </p:sp>
+      <p:pic>
+        <p:nvPicPr>
+          <p:cNvPr id="13" name="Picture 12">
+            <a:extLst>
+              <a:ext uri="{FF2B5EF4-FFF2-40B4-BE49-F238E27FC236}">
+                <a16:creationId xmlns:a16="http://schemas.microsoft.com/office/drawing/2014/main" id="{DF6FEE83-7935-4A5E-A2FC-F073488C74E9}"/>
+              </a:ext>
+            </a:extLst>
+          </p:cNvPr>
+          <p:cNvPicPr>
+            <a:picLocks noChangeAspect="1"/>
+          </p:cNvPicPr>
+          <p:nvPr/>
+        </p:nvPicPr>
+        <p:blipFill>
+          <a:blip r:embed="rId4">
+            <a:extLst>
+              <a:ext uri="{28A0092B-C50C-407E-A947-70E740481C1C}">
+                <a14:useLocalDpi xmlns:a14="http://schemas.microsoft.com/office/drawing/2010/main" val="0"/>
+              </a:ext>
+            </a:extLst>
+          </a:blip>
+          <a:srcRect/>
+          <a:stretch/>
+        </p:blipFill>
+        <p:spPr>
+          <a:xfrm>
+            <a:off x="108163" y="737021"/>
+            <a:ext cx="299372" cy="299372"/>
+          </a:xfrm>
+          <a:prstGeom prst="rect">
+            <a:avLst/>
+          </a:prstGeom>
+        </p:spPr>
+      </p:pic>
+      <p:pic>
+        <p:nvPicPr>
+          <p:cNvPr id="14" name="Picture 13">
+            <a:extLst>
+              <a:ext uri="{FF2B5EF4-FFF2-40B4-BE49-F238E27FC236}">
+                <a16:creationId xmlns:a16="http://schemas.microsoft.com/office/drawing/2014/main" id="{BA85A372-0DC7-4278-8831-172EE01DF109}"/>
+              </a:ext>
+            </a:extLst>
+          </p:cNvPr>
+          <p:cNvPicPr>
+            <a:picLocks noChangeAspect="1"/>
+          </p:cNvPicPr>
+          <p:nvPr/>
+        </p:nvPicPr>
+        <p:blipFill>
+          <a:blip r:embed="rId5">
+            <a:extLst>
+              <a:ext uri="{28A0092B-C50C-407E-A947-70E740481C1C}">
+                <a14:useLocalDpi xmlns:a14="http://schemas.microsoft.com/office/drawing/2010/main" val="0"/>
+              </a:ext>
+            </a:extLst>
+          </a:blip>
+          <a:srcRect/>
+          <a:stretch/>
+        </p:blipFill>
+        <p:spPr>
+          <a:xfrm>
+            <a:off x="109154" y="151744"/>
+            <a:ext cx="316644" cy="316644"/>
+          </a:xfrm>
+          <a:prstGeom prst="rect">
+            <a:avLst/>
+          </a:prstGeom>
+        </p:spPr>
+      </p:pic>
+      <p:pic>
+        <p:nvPicPr>
+          <p:cNvPr id="15" name="Picture 14">
+            <a:extLst>
+              <a:ext uri="{FF2B5EF4-FFF2-40B4-BE49-F238E27FC236}">
+                <a16:creationId xmlns:a16="http://schemas.microsoft.com/office/drawing/2014/main" id="{1524E185-AD6E-47D7-B589-BC1208D9865B}"/>
+              </a:ext>
+            </a:extLst>
+          </p:cNvPr>
+          <p:cNvPicPr>
+            <a:picLocks noChangeAspect="1"/>
+          </p:cNvPicPr>
+          <p:nvPr/>
+        </p:nvPicPr>
+        <p:blipFill>
+          <a:blip r:embed="rId6">
+            <a:extLst>
+              <a:ext uri="{28A0092B-C50C-407E-A947-70E740481C1C}">
+                <a14:useLocalDpi xmlns:a14="http://schemas.microsoft.com/office/drawing/2010/main" val="0"/>
+              </a:ext>
+            </a:extLst>
+          </a:blip>
+          <a:srcRect/>
+          <a:stretch/>
+        </p:blipFill>
+        <p:spPr>
+          <a:xfrm>
+            <a:off x="607055" y="1323687"/>
+            <a:ext cx="316644" cy="316644"/>
+          </a:xfrm>
+          <a:prstGeom prst="rect">
+            <a:avLst/>
+          </a:prstGeom>
+        </p:spPr>
+      </p:pic>
+      <p:pic>
+        <p:nvPicPr>
+          <p:cNvPr id="16" name="Picture 15">
+            <a:extLst>
+              <a:ext uri="{FF2B5EF4-FFF2-40B4-BE49-F238E27FC236}">
+                <a16:creationId xmlns:a16="http://schemas.microsoft.com/office/drawing/2014/main" id="{040F4A10-B3F5-4EAB-92EB-FF21ED185811}"/>
+              </a:ext>
+            </a:extLst>
+          </p:cNvPr>
+          <p:cNvPicPr>
+            <a:picLocks noChangeAspect="1"/>
+          </p:cNvPicPr>
+          <p:nvPr/>
+        </p:nvPicPr>
+        <p:blipFill>
+          <a:blip r:embed="rId7">
+            <a:extLst>
+              <a:ext uri="{28A0092B-C50C-407E-A947-70E740481C1C}">
+                <a14:useLocalDpi xmlns:a14="http://schemas.microsoft.com/office/drawing/2010/main" val="0"/>
+              </a:ext>
+            </a:extLst>
+          </a:blip>
+          <a:srcRect/>
+          <a:stretch/>
+        </p:blipFill>
+        <p:spPr>
+          <a:xfrm>
+            <a:off x="100678" y="1905353"/>
+            <a:ext cx="316644" cy="316644"/>
+          </a:xfrm>
+          <a:prstGeom prst="rect">
+            <a:avLst/>
+          </a:prstGeom>
+        </p:spPr>
+      </p:pic>
+      <p:pic>
+        <p:nvPicPr>
+          <p:cNvPr id="17" name="Picture 16">
+            <a:extLst>
+              <a:ext uri="{FF2B5EF4-FFF2-40B4-BE49-F238E27FC236}">
+                <a16:creationId xmlns:a16="http://schemas.microsoft.com/office/drawing/2014/main" id="{E0F2F15F-87B8-400C-A3CD-E0F69975F9E9}"/>
+              </a:ext>
+            </a:extLst>
+          </p:cNvPr>
+          <p:cNvPicPr>
+            <a:picLocks noChangeAspect="1"/>
+          </p:cNvPicPr>
+          <p:nvPr/>
+        </p:nvPicPr>
+        <p:blipFill>
+          <a:blip r:embed="rId8">
+            <a:extLst>
+              <a:ext uri="{28A0092B-C50C-407E-A947-70E740481C1C}">
+                <a14:useLocalDpi xmlns:a14="http://schemas.microsoft.com/office/drawing/2010/main" val="0"/>
+              </a:ext>
+            </a:extLst>
+          </a:blip>
+          <a:srcRect/>
+          <a:stretch/>
+        </p:blipFill>
+        <p:spPr>
+          <a:xfrm>
+            <a:off x="600835" y="1919471"/>
+            <a:ext cx="316644" cy="316644"/>
+          </a:xfrm>
+          <a:prstGeom prst="rect">
+            <a:avLst/>
+          </a:prstGeom>
+        </p:spPr>
+      </p:pic>
+      <p:pic>
+        <p:nvPicPr>
+          <p:cNvPr id="18" name="Picture 17">
+            <a:extLst>
+              <a:ext uri="{FF2B5EF4-FFF2-40B4-BE49-F238E27FC236}">
+                <a16:creationId xmlns:a16="http://schemas.microsoft.com/office/drawing/2014/main" id="{6A208D98-BA40-44CF-8648-D0A8FF018C38}"/>
+              </a:ext>
+            </a:extLst>
+          </p:cNvPr>
+          <p:cNvPicPr>
+            <a:picLocks noChangeAspect="1"/>
+          </p:cNvPicPr>
+          <p:nvPr/>
+        </p:nvPicPr>
+        <p:blipFill>
+          <a:blip r:embed="rId9">
+            <a:extLst>
+              <a:ext uri="{28A0092B-C50C-407E-A947-70E740481C1C}">
+                <a14:useLocalDpi xmlns:a14="http://schemas.microsoft.com/office/drawing/2010/main" val="0"/>
+              </a:ext>
+            </a:extLst>
+          </a:blip>
+          <a:srcRect/>
+          <a:stretch/>
+        </p:blipFill>
+        <p:spPr>
+          <a:xfrm>
+            <a:off x="612711" y="736364"/>
+            <a:ext cx="316644" cy="316644"/>
+          </a:xfrm>
+          <a:prstGeom prst="rect">
+            <a:avLst/>
+          </a:prstGeom>
+        </p:spPr>
+      </p:pic>
+      <p:sp>
+        <p:nvSpPr>
+          <p:cNvPr id="19" name="TextBox 18">
+            <a:extLst>
+              <a:ext uri="{FF2B5EF4-FFF2-40B4-BE49-F238E27FC236}">
+                <a16:creationId xmlns:a16="http://schemas.microsoft.com/office/drawing/2014/main" id="{4559ACFF-7146-43CE-AEE7-0FE76885A4A1}"/>
+              </a:ext>
+            </a:extLst>
+          </p:cNvPr>
+          <p:cNvSpPr txBox="1"/>
+          <p:nvPr/>
+        </p:nvSpPr>
+        <p:spPr>
+          <a:xfrm>
+            <a:off x="0" y="2229976"/>
+            <a:ext cx="1046163" cy="200055"/>
+          </a:xfrm>
+          <a:prstGeom prst="rect">
+            <a:avLst/>
+          </a:prstGeom>
+          <a:noFill/>
+        </p:spPr>
+        <p:txBody>
+          <a:bodyPr wrap="square" rtlCol="0">
+            <a:spAutoFit/>
+          </a:bodyPr>
+          <a:lstStyle/>
+          <a:p>
+            <a:pPr algn="ctr"/>
+            <a:r>
+              <a:rPr lang="en-GB" sz="700" dirty="0">
+                <a:latin typeface="Munro" panose="02000500000000000000" pitchFamily="2" charset="0"/>
+              </a:rPr>
+              <a:t>Cycle Tab</a:t>
+            </a:r>
+          </a:p>
+        </p:txBody>
+      </p:sp>
+      <p:pic>
+        <p:nvPicPr>
+          <p:cNvPr id="12" name="Picture 11">
+            <a:extLst>
+              <a:ext uri="{FF2B5EF4-FFF2-40B4-BE49-F238E27FC236}">
+                <a16:creationId xmlns:a16="http://schemas.microsoft.com/office/drawing/2014/main" id="{C4BC1585-4688-4B34-98CF-C1AEB8C1204B}"/>
+              </a:ext>
+            </a:extLst>
+          </p:cNvPr>
+          <p:cNvPicPr>
+            <a:picLocks noChangeAspect="1"/>
+          </p:cNvPicPr>
+          <p:nvPr/>
+        </p:nvPicPr>
+        <p:blipFill>
+          <a:blip r:embed="rId10">
+            <a:extLst>
+              <a:ext uri="{28A0092B-C50C-407E-A947-70E740481C1C}">
+                <a14:useLocalDpi xmlns:a14="http://schemas.microsoft.com/office/drawing/2010/main" val="0"/>
+              </a:ext>
+            </a:extLst>
+          </a:blip>
+          <a:srcRect/>
+          <a:stretch/>
+        </p:blipFill>
+        <p:spPr>
+          <a:xfrm>
+            <a:off x="625151" y="165195"/>
+            <a:ext cx="304798" cy="304798"/>
+          </a:xfrm>
+          <a:prstGeom prst="rect">
+            <a:avLst/>
+          </a:prstGeom>
+        </p:spPr>
+      </p:pic>
+    </p:spTree>
+    <p:extLst>
+      <p:ext uri="{BB962C8B-B14F-4D97-AF65-F5344CB8AC3E}">
+        <p14:creationId xmlns:p14="http://schemas.microsoft.com/office/powerpoint/2010/main" val="3868913443"/>
       </p:ext>
     </p:extLst>
   </p:cSld>

</xml_diff>

<commit_message>
Added new Chrome mode; edited scroll for VSCode
</commit_message>
<xml_diff>
--- a/Template.pptx
+++ b/Template.pptx
@@ -5,7 +5,7 @@
     <p:sldMasterId id="2147483660" r:id="rId1"/>
   </p:sldMasterIdLst>
   <p:notesMasterIdLst>
-    <p:notesMasterId r:id="rId9"/>
+    <p:notesMasterId r:id="rId10"/>
   </p:notesMasterIdLst>
   <p:sldIdLst>
     <p:sldId id="256" r:id="rId2"/>
@@ -15,6 +15,7 @@
     <p:sldId id="261" r:id="rId6"/>
     <p:sldId id="260" r:id="rId7"/>
     <p:sldId id="262" r:id="rId8"/>
+    <p:sldId id="263" r:id="rId9"/>
   </p:sldIdLst>
   <p:sldSz cx="1046163" cy="2408238"/>
   <p:notesSz cx="6858000" cy="9144000"/>
@@ -203,7 +204,7 @@
           <a:p>
             <a:fld id="{51EDFC51-4C06-47C1-8863-7AA26D3AE3DA}" type="datetimeFigureOut">
               <a:rPr lang="en-GB" smtClean="0"/>
-              <a:t>12/05/2024</a:t>
+              <a:t>06/07/2025</a:t>
             </a:fld>
             <a:endParaRPr lang="en-GB"/>
           </a:p>
@@ -9595,6 +9596,105 @@
 </p:notes>
 </file>
 
+<file path=ppt/notesSlides/notesSlide8.xml><?xml version="1.0" encoding="utf-8"?>
+<p:notes xmlns:a="http://schemas.openxmlformats.org/drawingml/2006/main" xmlns:r="http://schemas.openxmlformats.org/officeDocument/2006/relationships" xmlns:p="http://schemas.openxmlformats.org/presentationml/2006/main">
+  <p:cSld>
+    <p:spTree>
+      <p:nvGrpSpPr>
+        <p:cNvPr id="1" name=""/>
+        <p:cNvGrpSpPr/>
+        <p:nvPr/>
+      </p:nvGrpSpPr>
+      <p:grpSpPr>
+        <a:xfrm>
+          <a:off x="0" y="0"/>
+          <a:ext cx="0" cy="0"/>
+          <a:chOff x="0" y="0"/>
+          <a:chExt cx="0" cy="0"/>
+        </a:xfrm>
+      </p:grpSpPr>
+      <p:sp>
+        <p:nvSpPr>
+          <p:cNvPr id="2" name="Slide Image Placeholder 1"/>
+          <p:cNvSpPr>
+            <a:spLocks noGrp="1" noRot="1" noChangeAspect="1"/>
+          </p:cNvSpPr>
+          <p:nvPr>
+            <p:ph type="sldImg"/>
+          </p:nvPr>
+        </p:nvSpPr>
+        <p:spPr/>
+      </p:sp>
+      <p:sp>
+        <p:nvSpPr>
+          <p:cNvPr id="3" name="Notes Placeholder 2"/>
+          <p:cNvSpPr>
+            <a:spLocks noGrp="1"/>
+          </p:cNvSpPr>
+          <p:nvPr>
+            <p:ph type="body" idx="1"/>
+          </p:nvPr>
+        </p:nvSpPr>
+        <p:spPr/>
+        <p:txBody>
+          <a:bodyPr/>
+          <a:lstStyle/>
+          <a:p>
+            <a:r>
+              <a:rPr lang="en-GB" dirty="0"/>
+              <a:t>Outlook Reminder Pop up </a:t>
+            </a:r>
+          </a:p>
+          <a:p>
+            <a:r>
+              <a:rPr lang="en-GB" dirty="0"/>
+              <a:t>Flash wheel</a:t>
+            </a:r>
+          </a:p>
+          <a:p>
+            <a:r>
+              <a:rPr lang="en-GB"/>
+              <a:t>Set function alt tab</a:t>
+            </a:r>
+          </a:p>
+        </p:txBody>
+      </p:sp>
+      <p:sp>
+        <p:nvSpPr>
+          <p:cNvPr id="4" name="Slide Number Placeholder 3"/>
+          <p:cNvSpPr>
+            <a:spLocks noGrp="1"/>
+          </p:cNvSpPr>
+          <p:nvPr>
+            <p:ph type="sldNum" sz="quarter" idx="5"/>
+          </p:nvPr>
+        </p:nvSpPr>
+        <p:spPr/>
+        <p:txBody>
+          <a:bodyPr/>
+          <a:lstStyle/>
+          <a:p>
+            <a:fld id="{AD72BDD0-34C8-4178-8D35-D94E7CA1241E}" type="slidenum">
+              <a:rPr lang="en-GB" smtClean="0"/>
+              <a:t>8</a:t>
+            </a:fld>
+            <a:endParaRPr lang="en-GB"/>
+          </a:p>
+        </p:txBody>
+      </p:sp>
+    </p:spTree>
+    <p:extLst>
+      <p:ext uri="{BB962C8B-B14F-4D97-AF65-F5344CB8AC3E}">
+        <p14:creationId xmlns:p14="http://schemas.microsoft.com/office/powerpoint/2010/main" val="3658947141"/>
+      </p:ext>
+    </p:extLst>
+  </p:cSld>
+  <p:clrMapOvr>
+    <a:masterClrMapping/>
+  </p:clrMapOvr>
+</p:notes>
+</file>
+
 <file path=ppt/slideLayouts/slideLayout1.xml><?xml version="1.0" encoding="utf-8"?>
 <p:sldLayout xmlns:a="http://schemas.openxmlformats.org/drawingml/2006/main" xmlns:r="http://schemas.openxmlformats.org/officeDocument/2006/relationships" xmlns:p="http://schemas.openxmlformats.org/presentationml/2006/main" type="title" preserve="1">
   <p:cSld name="Title Slide">
@@ -9726,7 +9826,7 @@
           <a:p>
             <a:fld id="{EB80AE36-72A3-4046-B6E9-F6C2EA2323C6}" type="datetimeFigureOut">
               <a:rPr lang="en-GB" smtClean="0"/>
-              <a:t>12/05/2024</a:t>
+              <a:t>06/07/2025</a:t>
             </a:fld>
             <a:endParaRPr lang="en-GB"/>
           </a:p>
@@ -9896,7 +9996,7 @@
           <a:p>
             <a:fld id="{EB80AE36-72A3-4046-B6E9-F6C2EA2323C6}" type="datetimeFigureOut">
               <a:rPr lang="en-GB" smtClean="0"/>
-              <a:t>12/05/2024</a:t>
+              <a:t>06/07/2025</a:t>
             </a:fld>
             <a:endParaRPr lang="en-GB"/>
           </a:p>
@@ -10076,7 +10176,7 @@
           <a:p>
             <a:fld id="{EB80AE36-72A3-4046-B6E9-F6C2EA2323C6}" type="datetimeFigureOut">
               <a:rPr lang="en-GB" smtClean="0"/>
-              <a:t>12/05/2024</a:t>
+              <a:t>06/07/2025</a:t>
             </a:fld>
             <a:endParaRPr lang="en-GB"/>
           </a:p>
@@ -10246,7 +10346,7 @@
           <a:p>
             <a:fld id="{EB80AE36-72A3-4046-B6E9-F6C2EA2323C6}" type="datetimeFigureOut">
               <a:rPr lang="en-GB" smtClean="0"/>
-              <a:t>12/05/2024</a:t>
+              <a:t>06/07/2025</a:t>
             </a:fld>
             <a:endParaRPr lang="en-GB"/>
           </a:p>
@@ -10490,7 +10590,7 @@
           <a:p>
             <a:fld id="{EB80AE36-72A3-4046-B6E9-F6C2EA2323C6}" type="datetimeFigureOut">
               <a:rPr lang="en-GB" smtClean="0"/>
-              <a:t>12/05/2024</a:t>
+              <a:t>06/07/2025</a:t>
             </a:fld>
             <a:endParaRPr lang="en-GB"/>
           </a:p>
@@ -10722,7 +10822,7 @@
           <a:p>
             <a:fld id="{EB80AE36-72A3-4046-B6E9-F6C2EA2323C6}" type="datetimeFigureOut">
               <a:rPr lang="en-GB" smtClean="0"/>
-              <a:t>12/05/2024</a:t>
+              <a:t>06/07/2025</a:t>
             </a:fld>
             <a:endParaRPr lang="en-GB"/>
           </a:p>
@@ -11089,7 +11189,7 @@
           <a:p>
             <a:fld id="{EB80AE36-72A3-4046-B6E9-F6C2EA2323C6}" type="datetimeFigureOut">
               <a:rPr lang="en-GB" smtClean="0"/>
-              <a:t>12/05/2024</a:t>
+              <a:t>06/07/2025</a:t>
             </a:fld>
             <a:endParaRPr lang="en-GB"/>
           </a:p>
@@ -11207,7 +11307,7 @@
           <a:p>
             <a:fld id="{EB80AE36-72A3-4046-B6E9-F6C2EA2323C6}" type="datetimeFigureOut">
               <a:rPr lang="en-GB" smtClean="0"/>
-              <a:t>12/05/2024</a:t>
+              <a:t>06/07/2025</a:t>
             </a:fld>
             <a:endParaRPr lang="en-GB"/>
           </a:p>
@@ -11302,7 +11402,7 @@
           <a:p>
             <a:fld id="{EB80AE36-72A3-4046-B6E9-F6C2EA2323C6}" type="datetimeFigureOut">
               <a:rPr lang="en-GB" smtClean="0"/>
-              <a:t>12/05/2024</a:t>
+              <a:t>06/07/2025</a:t>
             </a:fld>
             <a:endParaRPr lang="en-GB"/>
           </a:p>
@@ -11579,7 +11679,7 @@
           <a:p>
             <a:fld id="{EB80AE36-72A3-4046-B6E9-F6C2EA2323C6}" type="datetimeFigureOut">
               <a:rPr lang="en-GB" smtClean="0"/>
-              <a:t>12/05/2024</a:t>
+              <a:t>06/07/2025</a:t>
             </a:fld>
             <a:endParaRPr lang="en-GB"/>
           </a:p>
@@ -11836,7 +11936,7 @@
           <a:p>
             <a:fld id="{EB80AE36-72A3-4046-B6E9-F6C2EA2323C6}" type="datetimeFigureOut">
               <a:rPr lang="en-GB" smtClean="0"/>
-              <a:t>12/05/2024</a:t>
+              <a:t>06/07/2025</a:t>
             </a:fld>
             <a:endParaRPr lang="en-GB"/>
           </a:p>
@@ -12049,7 +12149,7 @@
           <a:p>
             <a:fld id="{EB80AE36-72A3-4046-B6E9-F6C2EA2323C6}" type="datetimeFigureOut">
               <a:rPr lang="en-GB" smtClean="0"/>
-              <a:t>12/05/2024</a:t>
+              <a:t>06/07/2025</a:t>
             </a:fld>
             <a:endParaRPr lang="en-GB"/>
           </a:p>
@@ -15967,6 +16067,86 @@
     <p:extLst>
       <p:ext uri="{BB962C8B-B14F-4D97-AF65-F5344CB8AC3E}">
         <p14:creationId xmlns:p14="http://schemas.microsoft.com/office/powerpoint/2010/main" val="3868913443"/>
+      </p:ext>
+    </p:extLst>
+  </p:cSld>
+  <p:clrMapOvr>
+    <a:masterClrMapping/>
+  </p:clrMapOvr>
+</p:sld>
+</file>
+
+<file path=ppt/slides/slide8.xml><?xml version="1.0" encoding="utf-8"?>
+<p:sld xmlns:a="http://schemas.openxmlformats.org/drawingml/2006/main" xmlns:r="http://schemas.openxmlformats.org/officeDocument/2006/relationships" xmlns:p="http://schemas.openxmlformats.org/presentationml/2006/main">
+  <p:cSld>
+    <p:spTree>
+      <p:nvGrpSpPr>
+        <p:cNvPr id="1" name=""/>
+        <p:cNvGrpSpPr/>
+        <p:nvPr/>
+      </p:nvGrpSpPr>
+      <p:grpSpPr>
+        <a:xfrm>
+          <a:off x="0" y="0"/>
+          <a:ext cx="0" cy="0"/>
+          <a:chOff x="0" y="0"/>
+          <a:chExt cx="0" cy="0"/>
+        </a:xfrm>
+      </p:grpSpPr>
+      <p:sp>
+        <p:nvSpPr>
+          <p:cNvPr id="2" name="Title 1">
+            <a:extLst>
+              <a:ext uri="{FF2B5EF4-FFF2-40B4-BE49-F238E27FC236}">
+                <a16:creationId xmlns:a16="http://schemas.microsoft.com/office/drawing/2014/main" id="{4BECCC4C-08CE-2548-45E9-7168DDF73B30}"/>
+              </a:ext>
+            </a:extLst>
+          </p:cNvPr>
+          <p:cNvSpPr>
+            <a:spLocks noGrp="1"/>
+          </p:cNvSpPr>
+          <p:nvPr>
+            <p:ph type="title"/>
+          </p:nvPr>
+        </p:nvSpPr>
+        <p:spPr/>
+        <p:txBody>
+          <a:bodyPr/>
+          <a:lstStyle/>
+          <a:p>
+            <a:endParaRPr lang="en-GB"/>
+          </a:p>
+        </p:txBody>
+      </p:sp>
+      <p:sp>
+        <p:nvSpPr>
+          <p:cNvPr id="3" name="Content Placeholder 2">
+            <a:extLst>
+              <a:ext uri="{FF2B5EF4-FFF2-40B4-BE49-F238E27FC236}">
+                <a16:creationId xmlns:a16="http://schemas.microsoft.com/office/drawing/2014/main" id="{4E101A7C-AE8A-856B-E0E0-9BF0E27720AC}"/>
+              </a:ext>
+            </a:extLst>
+          </p:cNvPr>
+          <p:cNvSpPr>
+            <a:spLocks noGrp="1"/>
+          </p:cNvSpPr>
+          <p:nvPr>
+            <p:ph idx="1"/>
+          </p:nvPr>
+        </p:nvSpPr>
+        <p:spPr/>
+        <p:txBody>
+          <a:bodyPr/>
+          <a:lstStyle/>
+          <a:p>
+            <a:endParaRPr lang="en-GB"/>
+          </a:p>
+        </p:txBody>
+      </p:sp>
+    </p:spTree>
+    <p:extLst>
+      <p:ext uri="{BB962C8B-B14F-4D97-AF65-F5344CB8AC3E}">
+        <p14:creationId xmlns:p14="http://schemas.microsoft.com/office/powerpoint/2010/main" val="1176836750"/>
       </p:ext>
     </p:extLst>
   </p:cSld>

</xml_diff>